<commit_message>
update for new read counts
</commit_message>
<xml_diff>
--- a/Presentation-2025-02-18.pptx
+++ b/Presentation-2025-02-18.pptx
@@ -8,13 +8,17 @@
     <p:sldId id="256" r:id="rId2"/>
     <p:sldId id="257" r:id="rId3"/>
     <p:sldId id="258" r:id="rId4"/>
-    <p:sldId id="259" r:id="rId5"/>
-    <p:sldId id="260" r:id="rId6"/>
-    <p:sldId id="262" r:id="rId7"/>
-    <p:sldId id="263" r:id="rId8"/>
-    <p:sldId id="264" r:id="rId9"/>
-    <p:sldId id="265" r:id="rId10"/>
-    <p:sldId id="266" r:id="rId11"/>
+    <p:sldId id="267" r:id="rId5"/>
+    <p:sldId id="268" r:id="rId6"/>
+    <p:sldId id="269" r:id="rId7"/>
+    <p:sldId id="271" r:id="rId8"/>
+    <p:sldId id="260" r:id="rId9"/>
+    <p:sldId id="262" r:id="rId10"/>
+    <p:sldId id="263" r:id="rId11"/>
+    <p:sldId id="264" r:id="rId12"/>
+    <p:sldId id="265" r:id="rId13"/>
+    <p:sldId id="266" r:id="rId14"/>
+    <p:sldId id="270" r:id="rId15"/>
   </p:sldIdLst>
   <p:sldSz cx="12192000" cy="6858000"/>
   <p:notesSz cx="6858000" cy="9144000"/>
@@ -3431,6 +3435,1347 @@
         <p:cNvPr id="1" name="">
           <a:extLst>
             <a:ext uri="{FF2B5EF4-FFF2-40B4-BE49-F238E27FC236}">
+              <a16:creationId xmlns:a16="http://schemas.microsoft.com/office/drawing/2014/main" id="{0966912B-A684-06AB-36B9-F42137EC9654}"/>
+            </a:ext>
+          </a:extLst>
+        </p:cNvPr>
+        <p:cNvGrpSpPr/>
+        <p:nvPr/>
+      </p:nvGrpSpPr>
+      <p:grpSpPr>
+        <a:xfrm>
+          <a:off x="0" y="0"/>
+          <a:ext cx="0" cy="0"/>
+          <a:chOff x="0" y="0"/>
+          <a:chExt cx="0" cy="0"/>
+        </a:xfrm>
+      </p:grpSpPr>
+      <p:sp>
+        <p:nvSpPr>
+          <p:cNvPr id="2" name="Title 1">
+            <a:extLst>
+              <a:ext uri="{FF2B5EF4-FFF2-40B4-BE49-F238E27FC236}">
+                <a16:creationId xmlns:a16="http://schemas.microsoft.com/office/drawing/2014/main" id="{BCB27296-4E7C-2714-A966-DDBCBA996439}"/>
+              </a:ext>
+            </a:extLst>
+          </p:cNvPr>
+          <p:cNvSpPr>
+            <a:spLocks noGrp="1"/>
+          </p:cNvSpPr>
+          <p:nvPr>
+            <p:ph type="title"/>
+          </p:nvPr>
+        </p:nvSpPr>
+        <p:spPr>
+          <a:xfrm>
+            <a:off x="838200" y="80918"/>
+            <a:ext cx="10515600" cy="648129"/>
+          </a:xfrm>
+        </p:spPr>
+        <p:txBody>
+          <a:bodyPr>
+            <a:normAutofit fontScale="90000"/>
+          </a:bodyPr>
+          <a:lstStyle/>
+          <a:p>
+            <a:r>
+              <a:rPr lang="en-US" dirty="0"/>
+              <a:t>Network attempt 1: WGCNA, sporophyte</a:t>
+            </a:r>
+          </a:p>
+        </p:txBody>
+      </p:sp>
+      <p:sp>
+        <p:nvSpPr>
+          <p:cNvPr id="4" name="AutoShape 2">
+            <a:extLst>
+              <a:ext uri="{FF2B5EF4-FFF2-40B4-BE49-F238E27FC236}">
+                <a16:creationId xmlns:a16="http://schemas.microsoft.com/office/drawing/2014/main" id="{DBAA65A9-1A31-DBC0-BCC4-96B8F6D8CD7E}"/>
+              </a:ext>
+            </a:extLst>
+          </p:cNvPr>
+          <p:cNvSpPr>
+            <a:spLocks noChangeAspect="1" noChangeArrowheads="1"/>
+          </p:cNvSpPr>
+          <p:nvPr/>
+        </p:nvSpPr>
+        <p:spPr bwMode="auto">
+          <a:xfrm>
+            <a:off x="5943600" y="3276600"/>
+            <a:ext cx="304800" cy="304800"/>
+          </a:xfrm>
+          <a:prstGeom prst="rect">
+            <a:avLst/>
+          </a:prstGeom>
+          <a:noFill/>
+          <a:extLst>
+            <a:ext uri="{909E8E84-426E-40DD-AFC4-6F175D3DCCD1}">
+              <a14:hiddenFill xmlns:a14="http://schemas.microsoft.com/office/drawing/2010/main">
+                <a:solidFill>
+                  <a:srgbClr val="FFFFFF"/>
+                </a:solidFill>
+              </a14:hiddenFill>
+            </a:ext>
+          </a:extLst>
+        </p:spPr>
+        <p:txBody>
+          <a:bodyPr vert="horz" wrap="square" lIns="91440" tIns="45720" rIns="91440" bIns="45720" numCol="1" anchor="t" anchorCtr="0" compatLnSpc="1">
+            <a:prstTxWarp prst="textNoShape">
+              <a:avLst/>
+            </a:prstTxWarp>
+          </a:bodyPr>
+          <a:lstStyle/>
+          <a:p>
+            <a:endParaRPr lang="en-US"/>
+          </a:p>
+        </p:txBody>
+      </p:sp>
+      <p:sp>
+        <p:nvSpPr>
+          <p:cNvPr id="5" name="AutoShape 4">
+            <a:extLst>
+              <a:ext uri="{FF2B5EF4-FFF2-40B4-BE49-F238E27FC236}">
+                <a16:creationId xmlns:a16="http://schemas.microsoft.com/office/drawing/2014/main" id="{707B7639-70EA-FA50-3762-2A91C060EEAC}"/>
+              </a:ext>
+            </a:extLst>
+          </p:cNvPr>
+          <p:cNvSpPr>
+            <a:spLocks noChangeAspect="1" noChangeArrowheads="1"/>
+          </p:cNvSpPr>
+          <p:nvPr/>
+        </p:nvSpPr>
+        <p:spPr bwMode="auto">
+          <a:xfrm>
+            <a:off x="6096000" y="3429000"/>
+            <a:ext cx="304800" cy="304800"/>
+          </a:xfrm>
+          <a:prstGeom prst="rect">
+            <a:avLst/>
+          </a:prstGeom>
+          <a:noFill/>
+          <a:extLst>
+            <a:ext uri="{909E8E84-426E-40DD-AFC4-6F175D3DCCD1}">
+              <a14:hiddenFill xmlns:a14="http://schemas.microsoft.com/office/drawing/2010/main">
+                <a:solidFill>
+                  <a:srgbClr val="FFFFFF"/>
+                </a:solidFill>
+              </a14:hiddenFill>
+            </a:ext>
+          </a:extLst>
+        </p:spPr>
+        <p:txBody>
+          <a:bodyPr vert="horz" wrap="square" lIns="91440" tIns="45720" rIns="91440" bIns="45720" numCol="1" anchor="t" anchorCtr="0" compatLnSpc="1">
+            <a:prstTxWarp prst="textNoShape">
+              <a:avLst/>
+            </a:prstTxWarp>
+          </a:bodyPr>
+          <a:lstStyle/>
+          <a:p>
+            <a:endParaRPr lang="en-US"/>
+          </a:p>
+        </p:txBody>
+      </p:sp>
+      <p:sp>
+        <p:nvSpPr>
+          <p:cNvPr id="6" name="AutoShape 6">
+            <a:extLst>
+              <a:ext uri="{FF2B5EF4-FFF2-40B4-BE49-F238E27FC236}">
+                <a16:creationId xmlns:a16="http://schemas.microsoft.com/office/drawing/2014/main" id="{AE78DDD8-0660-8C6C-0D5E-C7BBCA0FF775}"/>
+              </a:ext>
+            </a:extLst>
+          </p:cNvPr>
+          <p:cNvSpPr>
+            <a:spLocks noChangeAspect="1" noChangeArrowheads="1"/>
+          </p:cNvSpPr>
+          <p:nvPr/>
+        </p:nvSpPr>
+        <p:spPr bwMode="auto">
+          <a:xfrm>
+            <a:off x="4114800" y="1447800"/>
+            <a:ext cx="2438400" cy="2438400"/>
+          </a:xfrm>
+          <a:prstGeom prst="rect">
+            <a:avLst/>
+          </a:prstGeom>
+          <a:noFill/>
+          <a:extLst>
+            <a:ext uri="{909E8E84-426E-40DD-AFC4-6F175D3DCCD1}">
+              <a14:hiddenFill xmlns:a14="http://schemas.microsoft.com/office/drawing/2010/main">
+                <a:solidFill>
+                  <a:srgbClr val="FFFFFF"/>
+                </a:solidFill>
+              </a14:hiddenFill>
+            </a:ext>
+          </a:extLst>
+        </p:spPr>
+        <p:txBody>
+          <a:bodyPr vert="horz" wrap="square" lIns="91440" tIns="45720" rIns="91440" bIns="45720" numCol="1" anchor="t" anchorCtr="0" compatLnSpc="1">
+            <a:prstTxWarp prst="textNoShape">
+              <a:avLst/>
+            </a:prstTxWarp>
+          </a:bodyPr>
+          <a:lstStyle/>
+          <a:p>
+            <a:endParaRPr lang="en-US"/>
+          </a:p>
+        </p:txBody>
+      </p:sp>
+      <p:sp>
+        <p:nvSpPr>
+          <p:cNvPr id="7" name="AutoShape 8">
+            <a:extLst>
+              <a:ext uri="{FF2B5EF4-FFF2-40B4-BE49-F238E27FC236}">
+                <a16:creationId xmlns:a16="http://schemas.microsoft.com/office/drawing/2014/main" id="{83636A0B-F713-5020-C036-8993E704BD6B}"/>
+              </a:ext>
+            </a:extLst>
+          </p:cNvPr>
+          <p:cNvSpPr>
+            <a:spLocks noChangeAspect="1" noChangeArrowheads="1"/>
+          </p:cNvSpPr>
+          <p:nvPr/>
+        </p:nvSpPr>
+        <p:spPr bwMode="auto">
+          <a:xfrm>
+            <a:off x="6248400" y="1213022"/>
+            <a:ext cx="2673178" cy="2673178"/>
+          </a:xfrm>
+          <a:prstGeom prst="rect">
+            <a:avLst/>
+          </a:prstGeom>
+          <a:noFill/>
+          <a:extLst>
+            <a:ext uri="{909E8E84-426E-40DD-AFC4-6F175D3DCCD1}">
+              <a14:hiddenFill xmlns:a14="http://schemas.microsoft.com/office/drawing/2010/main">
+                <a:solidFill>
+                  <a:srgbClr val="FFFFFF"/>
+                </a:solidFill>
+              </a14:hiddenFill>
+            </a:ext>
+          </a:extLst>
+        </p:spPr>
+        <p:txBody>
+          <a:bodyPr vert="horz" wrap="square" lIns="91440" tIns="45720" rIns="91440" bIns="45720" numCol="1" anchor="t" anchorCtr="0" compatLnSpc="1">
+            <a:prstTxWarp prst="textNoShape">
+              <a:avLst/>
+            </a:prstTxWarp>
+          </a:bodyPr>
+          <a:lstStyle/>
+          <a:p>
+            <a:endParaRPr lang="en-US"/>
+          </a:p>
+        </p:txBody>
+      </p:sp>
+      <p:sp>
+        <p:nvSpPr>
+          <p:cNvPr id="10" name="TextBox 9">
+            <a:extLst>
+              <a:ext uri="{FF2B5EF4-FFF2-40B4-BE49-F238E27FC236}">
+                <a16:creationId xmlns:a16="http://schemas.microsoft.com/office/drawing/2014/main" id="{657F750A-74B0-B889-847F-FD3304E4F975}"/>
+              </a:ext>
+            </a:extLst>
+          </p:cNvPr>
+          <p:cNvSpPr txBox="1"/>
+          <p:nvPr/>
+        </p:nvSpPr>
+        <p:spPr>
+          <a:xfrm>
+            <a:off x="10132541" y="506627"/>
+            <a:ext cx="1915297" cy="3139321"/>
+          </a:xfrm>
+          <a:prstGeom prst="rect">
+            <a:avLst/>
+          </a:prstGeom>
+          <a:noFill/>
+        </p:spPr>
+        <p:txBody>
+          <a:bodyPr wrap="square" rtlCol="0">
+            <a:spAutoFit/>
+          </a:bodyPr>
+          <a:lstStyle/>
+          <a:p>
+            <a:r>
+              <a:rPr lang="en-US" dirty="0"/>
+              <a:t>Each “color” is a module</a:t>
+            </a:r>
+          </a:p>
+          <a:p>
+            <a:endParaRPr lang="en-US" dirty="0"/>
+          </a:p>
+          <a:p>
+            <a:r>
+              <a:rPr lang="en-US" dirty="0"/>
+              <a:t>Y-axis is first PC of expression of that module</a:t>
+            </a:r>
+          </a:p>
+          <a:p>
+            <a:endParaRPr lang="en-US" dirty="0"/>
+          </a:p>
+          <a:p>
+            <a:r>
+              <a:rPr lang="en-US" dirty="0"/>
+              <a:t>LFY1 is in BROWN</a:t>
+            </a:r>
+          </a:p>
+          <a:p>
+            <a:endParaRPr lang="en-US" dirty="0"/>
+          </a:p>
+          <a:p>
+            <a:r>
+              <a:rPr lang="en-US" dirty="0"/>
+              <a:t>LFY2 is in BLUE</a:t>
+            </a:r>
+          </a:p>
+        </p:txBody>
+      </p:sp>
+      <p:pic>
+        <p:nvPicPr>
+          <p:cNvPr id="12" name="Picture 11">
+            <a:extLst>
+              <a:ext uri="{FF2B5EF4-FFF2-40B4-BE49-F238E27FC236}">
+                <a16:creationId xmlns:a16="http://schemas.microsoft.com/office/drawing/2014/main" id="{CBCCCA83-095E-5704-FEA3-06E054728A95}"/>
+              </a:ext>
+            </a:extLst>
+          </p:cNvPr>
+          <p:cNvPicPr>
+            <a:picLocks noChangeAspect="1"/>
+          </p:cNvPicPr>
+          <p:nvPr/>
+        </p:nvPicPr>
+        <p:blipFill>
+          <a:blip r:embed="rId2"/>
+          <a:stretch>
+            <a:fillRect/>
+          </a:stretch>
+        </p:blipFill>
+        <p:spPr>
+          <a:xfrm>
+            <a:off x="308344" y="720811"/>
+            <a:ext cx="9874230" cy="5924538"/>
+          </a:xfrm>
+          <a:prstGeom prst="rect">
+            <a:avLst/>
+          </a:prstGeom>
+        </p:spPr>
+      </p:pic>
+      <p:sp>
+        <p:nvSpPr>
+          <p:cNvPr id="13" name="Rounded Rectangle 12">
+            <a:extLst>
+              <a:ext uri="{FF2B5EF4-FFF2-40B4-BE49-F238E27FC236}">
+                <a16:creationId xmlns:a16="http://schemas.microsoft.com/office/drawing/2014/main" id="{B81D4FC4-62C5-E203-18C9-E87BE6294DFC}"/>
+              </a:ext>
+            </a:extLst>
+          </p:cNvPr>
+          <p:cNvSpPr/>
+          <p:nvPr/>
+        </p:nvSpPr>
+        <p:spPr>
+          <a:xfrm>
+            <a:off x="2456121" y="729048"/>
+            <a:ext cx="1733107" cy="812674"/>
+          </a:xfrm>
+          <a:prstGeom prst="roundRect">
+            <a:avLst/>
+          </a:prstGeom>
+          <a:noFill/>
+          <a:ln w="38100">
+            <a:solidFill>
+              <a:srgbClr val="FF0000"/>
+            </a:solidFill>
+          </a:ln>
+        </p:spPr>
+        <p:style>
+          <a:lnRef idx="2">
+            <a:schemeClr val="accent1">
+              <a:shade val="15000"/>
+            </a:schemeClr>
+          </a:lnRef>
+          <a:fillRef idx="1">
+            <a:schemeClr val="accent1"/>
+          </a:fillRef>
+          <a:effectRef idx="0">
+            <a:schemeClr val="accent1"/>
+          </a:effectRef>
+          <a:fontRef idx="minor">
+            <a:schemeClr val="lt1"/>
+          </a:fontRef>
+        </p:style>
+        <p:txBody>
+          <a:bodyPr rtlCol="0" anchor="ctr"/>
+          <a:lstStyle/>
+          <a:p>
+            <a:pPr algn="ctr"/>
+            <a:endParaRPr lang="en-US"/>
+          </a:p>
+        </p:txBody>
+      </p:sp>
+      <p:sp>
+        <p:nvSpPr>
+          <p:cNvPr id="14" name="Rounded Rectangle 13">
+            <a:extLst>
+              <a:ext uri="{FF2B5EF4-FFF2-40B4-BE49-F238E27FC236}">
+                <a16:creationId xmlns:a16="http://schemas.microsoft.com/office/drawing/2014/main" id="{5B02E1AC-2C6B-BCA4-A261-77091D256E7F}"/>
+              </a:ext>
+            </a:extLst>
+          </p:cNvPr>
+          <p:cNvSpPr/>
+          <p:nvPr/>
+        </p:nvSpPr>
+        <p:spPr>
+          <a:xfrm>
+            <a:off x="4189228" y="715776"/>
+            <a:ext cx="1658679" cy="836580"/>
+          </a:xfrm>
+          <a:prstGeom prst="roundRect">
+            <a:avLst/>
+          </a:prstGeom>
+          <a:noFill/>
+          <a:ln w="38100">
+            <a:solidFill>
+              <a:srgbClr val="00B0F0"/>
+            </a:solidFill>
+          </a:ln>
+        </p:spPr>
+        <p:style>
+          <a:lnRef idx="2">
+            <a:schemeClr val="accent1">
+              <a:shade val="15000"/>
+            </a:schemeClr>
+          </a:lnRef>
+          <a:fillRef idx="1">
+            <a:schemeClr val="accent1"/>
+          </a:fillRef>
+          <a:effectRef idx="0">
+            <a:schemeClr val="accent1"/>
+          </a:effectRef>
+          <a:fontRef idx="minor">
+            <a:schemeClr val="lt1"/>
+          </a:fontRef>
+        </p:style>
+        <p:txBody>
+          <a:bodyPr rtlCol="0" anchor="ctr"/>
+          <a:lstStyle/>
+          <a:p>
+            <a:pPr algn="ctr"/>
+            <a:endParaRPr lang="en-US"/>
+          </a:p>
+        </p:txBody>
+      </p:sp>
+    </p:spTree>
+    <p:extLst>
+      <p:ext uri="{BB962C8B-B14F-4D97-AF65-F5344CB8AC3E}">
+        <p14:creationId xmlns:p14="http://schemas.microsoft.com/office/powerpoint/2010/main" val="3885862352"/>
+      </p:ext>
+    </p:extLst>
+  </p:cSld>
+  <p:clrMapOvr>
+    <a:masterClrMapping/>
+  </p:clrMapOvr>
+</p:sld>
+</file>
+
+<file path=ppt/slides/slide11.xml><?xml version="1.0" encoding="utf-8"?>
+<p:sld xmlns:a="http://schemas.openxmlformats.org/drawingml/2006/main" xmlns:r="http://schemas.openxmlformats.org/officeDocument/2006/relationships" xmlns:p="http://schemas.openxmlformats.org/presentationml/2006/main">
+  <p:cSld>
+    <p:spTree>
+      <p:nvGrpSpPr>
+        <p:cNvPr id="1" name="">
+          <a:extLst>
+            <a:ext uri="{FF2B5EF4-FFF2-40B4-BE49-F238E27FC236}">
+              <a16:creationId xmlns:a16="http://schemas.microsoft.com/office/drawing/2014/main" id="{F5F17DC0-03DA-E9E4-EC77-BC3C72A1D29D}"/>
+            </a:ext>
+          </a:extLst>
+        </p:cNvPr>
+        <p:cNvGrpSpPr/>
+        <p:nvPr/>
+      </p:nvGrpSpPr>
+      <p:grpSpPr>
+        <a:xfrm>
+          <a:off x="0" y="0"/>
+          <a:ext cx="0" cy="0"/>
+          <a:chOff x="0" y="0"/>
+          <a:chExt cx="0" cy="0"/>
+        </a:xfrm>
+      </p:grpSpPr>
+      <p:sp>
+        <p:nvSpPr>
+          <p:cNvPr id="2" name="Title 1">
+            <a:extLst>
+              <a:ext uri="{FF2B5EF4-FFF2-40B4-BE49-F238E27FC236}">
+                <a16:creationId xmlns:a16="http://schemas.microsoft.com/office/drawing/2014/main" id="{CC473A95-1E34-3AC5-C98F-09CE2AFE6058}"/>
+              </a:ext>
+            </a:extLst>
+          </p:cNvPr>
+          <p:cNvSpPr>
+            <a:spLocks noGrp="1"/>
+          </p:cNvSpPr>
+          <p:nvPr>
+            <p:ph type="title"/>
+          </p:nvPr>
+        </p:nvSpPr>
+        <p:spPr>
+          <a:xfrm>
+            <a:off x="838200" y="80918"/>
+            <a:ext cx="10515600" cy="648129"/>
+          </a:xfrm>
+        </p:spPr>
+        <p:txBody>
+          <a:bodyPr>
+            <a:normAutofit fontScale="90000"/>
+          </a:bodyPr>
+          <a:lstStyle/>
+          <a:p>
+            <a:r>
+              <a:rPr lang="en-US" dirty="0"/>
+              <a:t>Network attempt 1: WGCNA, sporophyte</a:t>
+            </a:r>
+          </a:p>
+        </p:txBody>
+      </p:sp>
+      <p:sp>
+        <p:nvSpPr>
+          <p:cNvPr id="4" name="AutoShape 2">
+            <a:extLst>
+              <a:ext uri="{FF2B5EF4-FFF2-40B4-BE49-F238E27FC236}">
+                <a16:creationId xmlns:a16="http://schemas.microsoft.com/office/drawing/2014/main" id="{13AC5588-9364-EF23-1F17-6EC4FC9ADD66}"/>
+              </a:ext>
+            </a:extLst>
+          </p:cNvPr>
+          <p:cNvSpPr>
+            <a:spLocks noChangeAspect="1" noChangeArrowheads="1"/>
+          </p:cNvSpPr>
+          <p:nvPr/>
+        </p:nvSpPr>
+        <p:spPr bwMode="auto">
+          <a:xfrm>
+            <a:off x="5943600" y="3276600"/>
+            <a:ext cx="304800" cy="304800"/>
+          </a:xfrm>
+          <a:prstGeom prst="rect">
+            <a:avLst/>
+          </a:prstGeom>
+          <a:noFill/>
+          <a:extLst>
+            <a:ext uri="{909E8E84-426E-40DD-AFC4-6F175D3DCCD1}">
+              <a14:hiddenFill xmlns:a14="http://schemas.microsoft.com/office/drawing/2010/main">
+                <a:solidFill>
+                  <a:srgbClr val="FFFFFF"/>
+                </a:solidFill>
+              </a14:hiddenFill>
+            </a:ext>
+          </a:extLst>
+        </p:spPr>
+        <p:txBody>
+          <a:bodyPr vert="horz" wrap="square" lIns="91440" tIns="45720" rIns="91440" bIns="45720" numCol="1" anchor="t" anchorCtr="0" compatLnSpc="1">
+            <a:prstTxWarp prst="textNoShape">
+              <a:avLst/>
+            </a:prstTxWarp>
+          </a:bodyPr>
+          <a:lstStyle/>
+          <a:p>
+            <a:endParaRPr lang="en-US"/>
+          </a:p>
+        </p:txBody>
+      </p:sp>
+      <p:sp>
+        <p:nvSpPr>
+          <p:cNvPr id="5" name="AutoShape 4">
+            <a:extLst>
+              <a:ext uri="{FF2B5EF4-FFF2-40B4-BE49-F238E27FC236}">
+                <a16:creationId xmlns:a16="http://schemas.microsoft.com/office/drawing/2014/main" id="{ADF5AE60-48ED-BFAB-B1F7-7561EAA98B3F}"/>
+              </a:ext>
+            </a:extLst>
+          </p:cNvPr>
+          <p:cNvSpPr>
+            <a:spLocks noChangeAspect="1" noChangeArrowheads="1"/>
+          </p:cNvSpPr>
+          <p:nvPr/>
+        </p:nvSpPr>
+        <p:spPr bwMode="auto">
+          <a:xfrm>
+            <a:off x="6096000" y="3429000"/>
+            <a:ext cx="304800" cy="304800"/>
+          </a:xfrm>
+          <a:prstGeom prst="rect">
+            <a:avLst/>
+          </a:prstGeom>
+          <a:noFill/>
+          <a:extLst>
+            <a:ext uri="{909E8E84-426E-40DD-AFC4-6F175D3DCCD1}">
+              <a14:hiddenFill xmlns:a14="http://schemas.microsoft.com/office/drawing/2010/main">
+                <a:solidFill>
+                  <a:srgbClr val="FFFFFF"/>
+                </a:solidFill>
+              </a14:hiddenFill>
+            </a:ext>
+          </a:extLst>
+        </p:spPr>
+        <p:txBody>
+          <a:bodyPr vert="horz" wrap="square" lIns="91440" tIns="45720" rIns="91440" bIns="45720" numCol="1" anchor="t" anchorCtr="0" compatLnSpc="1">
+            <a:prstTxWarp prst="textNoShape">
+              <a:avLst/>
+            </a:prstTxWarp>
+          </a:bodyPr>
+          <a:lstStyle/>
+          <a:p>
+            <a:endParaRPr lang="en-US"/>
+          </a:p>
+        </p:txBody>
+      </p:sp>
+      <p:sp>
+        <p:nvSpPr>
+          <p:cNvPr id="6" name="AutoShape 6">
+            <a:extLst>
+              <a:ext uri="{FF2B5EF4-FFF2-40B4-BE49-F238E27FC236}">
+                <a16:creationId xmlns:a16="http://schemas.microsoft.com/office/drawing/2014/main" id="{26B03028-483F-D754-EDB3-1F234EB450F7}"/>
+              </a:ext>
+            </a:extLst>
+          </p:cNvPr>
+          <p:cNvSpPr>
+            <a:spLocks noChangeAspect="1" noChangeArrowheads="1"/>
+          </p:cNvSpPr>
+          <p:nvPr/>
+        </p:nvSpPr>
+        <p:spPr bwMode="auto">
+          <a:xfrm>
+            <a:off x="4114800" y="1447800"/>
+            <a:ext cx="2438400" cy="2438400"/>
+          </a:xfrm>
+          <a:prstGeom prst="rect">
+            <a:avLst/>
+          </a:prstGeom>
+          <a:noFill/>
+          <a:extLst>
+            <a:ext uri="{909E8E84-426E-40DD-AFC4-6F175D3DCCD1}">
+              <a14:hiddenFill xmlns:a14="http://schemas.microsoft.com/office/drawing/2010/main">
+                <a:solidFill>
+                  <a:srgbClr val="FFFFFF"/>
+                </a:solidFill>
+              </a14:hiddenFill>
+            </a:ext>
+          </a:extLst>
+        </p:spPr>
+        <p:txBody>
+          <a:bodyPr vert="horz" wrap="square" lIns="91440" tIns="45720" rIns="91440" bIns="45720" numCol="1" anchor="t" anchorCtr="0" compatLnSpc="1">
+            <a:prstTxWarp prst="textNoShape">
+              <a:avLst/>
+            </a:prstTxWarp>
+          </a:bodyPr>
+          <a:lstStyle/>
+          <a:p>
+            <a:endParaRPr lang="en-US"/>
+          </a:p>
+        </p:txBody>
+      </p:sp>
+      <p:sp>
+        <p:nvSpPr>
+          <p:cNvPr id="7" name="AutoShape 8">
+            <a:extLst>
+              <a:ext uri="{FF2B5EF4-FFF2-40B4-BE49-F238E27FC236}">
+                <a16:creationId xmlns:a16="http://schemas.microsoft.com/office/drawing/2014/main" id="{11E4D984-CB4A-6FE3-4437-E694864E9FBF}"/>
+              </a:ext>
+            </a:extLst>
+          </p:cNvPr>
+          <p:cNvSpPr>
+            <a:spLocks noChangeAspect="1" noChangeArrowheads="1"/>
+          </p:cNvSpPr>
+          <p:nvPr/>
+        </p:nvSpPr>
+        <p:spPr bwMode="auto">
+          <a:xfrm>
+            <a:off x="6248400" y="1213022"/>
+            <a:ext cx="2673178" cy="2673178"/>
+          </a:xfrm>
+          <a:prstGeom prst="rect">
+            <a:avLst/>
+          </a:prstGeom>
+          <a:noFill/>
+          <a:extLst>
+            <a:ext uri="{909E8E84-426E-40DD-AFC4-6F175D3DCCD1}">
+              <a14:hiddenFill xmlns:a14="http://schemas.microsoft.com/office/drawing/2010/main">
+                <a:solidFill>
+                  <a:srgbClr val="FFFFFF"/>
+                </a:solidFill>
+              </a14:hiddenFill>
+            </a:ext>
+          </a:extLst>
+        </p:spPr>
+        <p:txBody>
+          <a:bodyPr vert="horz" wrap="square" lIns="91440" tIns="45720" rIns="91440" bIns="45720" numCol="1" anchor="t" anchorCtr="0" compatLnSpc="1">
+            <a:prstTxWarp prst="textNoShape">
+              <a:avLst/>
+            </a:prstTxWarp>
+          </a:bodyPr>
+          <a:lstStyle/>
+          <a:p>
+            <a:endParaRPr lang="en-US"/>
+          </a:p>
+        </p:txBody>
+      </p:sp>
+      <p:sp>
+        <p:nvSpPr>
+          <p:cNvPr id="10" name="TextBox 9">
+            <a:extLst>
+              <a:ext uri="{FF2B5EF4-FFF2-40B4-BE49-F238E27FC236}">
+                <a16:creationId xmlns:a16="http://schemas.microsoft.com/office/drawing/2014/main" id="{0E669337-94A7-C26E-1290-A632CE970367}"/>
+              </a:ext>
+            </a:extLst>
+          </p:cNvPr>
+          <p:cNvSpPr txBox="1"/>
+          <p:nvPr/>
+        </p:nvSpPr>
+        <p:spPr>
+          <a:xfrm>
+            <a:off x="10132541" y="506627"/>
+            <a:ext cx="1915297" cy="3139321"/>
+          </a:xfrm>
+          <a:prstGeom prst="rect">
+            <a:avLst/>
+          </a:prstGeom>
+          <a:noFill/>
+        </p:spPr>
+        <p:txBody>
+          <a:bodyPr wrap="square" rtlCol="0">
+            <a:spAutoFit/>
+          </a:bodyPr>
+          <a:lstStyle/>
+          <a:p>
+            <a:r>
+              <a:rPr lang="en-US" dirty="0"/>
+              <a:t>Each “color” is a module</a:t>
+            </a:r>
+          </a:p>
+          <a:p>
+            <a:endParaRPr lang="en-US" dirty="0"/>
+          </a:p>
+          <a:p>
+            <a:r>
+              <a:rPr lang="en-US" dirty="0"/>
+              <a:t>heatmap is first PC of expression of that module</a:t>
+            </a:r>
+          </a:p>
+          <a:p>
+            <a:endParaRPr lang="en-US" dirty="0"/>
+          </a:p>
+          <a:p>
+            <a:r>
+              <a:rPr lang="en-US" dirty="0"/>
+              <a:t>LFY1 is in BROWN</a:t>
+            </a:r>
+          </a:p>
+          <a:p>
+            <a:endParaRPr lang="en-US" dirty="0"/>
+          </a:p>
+          <a:p>
+            <a:r>
+              <a:rPr lang="en-US" dirty="0"/>
+              <a:t>LFY2 is in BLUE</a:t>
+            </a:r>
+          </a:p>
+        </p:txBody>
+      </p:sp>
+      <p:pic>
+        <p:nvPicPr>
+          <p:cNvPr id="12" name="Picture 11">
+            <a:extLst>
+              <a:ext uri="{FF2B5EF4-FFF2-40B4-BE49-F238E27FC236}">
+                <a16:creationId xmlns:a16="http://schemas.microsoft.com/office/drawing/2014/main" id="{DA31A106-CC8D-B34B-E4A1-281C72D970D4}"/>
+              </a:ext>
+            </a:extLst>
+          </p:cNvPr>
+          <p:cNvPicPr>
+            <a:picLocks noChangeAspect="1"/>
+          </p:cNvPicPr>
+          <p:nvPr/>
+        </p:nvPicPr>
+        <p:blipFill>
+          <a:blip r:embed="rId2"/>
+          <a:stretch>
+            <a:fillRect/>
+          </a:stretch>
+        </p:blipFill>
+        <p:spPr>
+          <a:xfrm>
+            <a:off x="340684" y="729047"/>
+            <a:ext cx="9578349" cy="5926934"/>
+          </a:xfrm>
+          <a:prstGeom prst="rect">
+            <a:avLst/>
+          </a:prstGeom>
+        </p:spPr>
+      </p:pic>
+      <p:sp>
+        <p:nvSpPr>
+          <p:cNvPr id="13" name="Rounded Rectangle 12">
+            <a:extLst>
+              <a:ext uri="{FF2B5EF4-FFF2-40B4-BE49-F238E27FC236}">
+                <a16:creationId xmlns:a16="http://schemas.microsoft.com/office/drawing/2014/main" id="{EB472981-EC95-F1D6-405C-A2712D455A05}"/>
+              </a:ext>
+            </a:extLst>
+          </p:cNvPr>
+          <p:cNvSpPr/>
+          <p:nvPr/>
+        </p:nvSpPr>
+        <p:spPr>
+          <a:xfrm>
+            <a:off x="3185391" y="2303585"/>
+            <a:ext cx="218303" cy="4461092"/>
+          </a:xfrm>
+          <a:prstGeom prst="roundRect">
+            <a:avLst/>
+          </a:prstGeom>
+          <a:noFill/>
+          <a:ln w="38100">
+            <a:solidFill>
+              <a:srgbClr val="FF0000"/>
+            </a:solidFill>
+          </a:ln>
+        </p:spPr>
+        <p:style>
+          <a:lnRef idx="2">
+            <a:schemeClr val="accent1">
+              <a:shade val="15000"/>
+            </a:schemeClr>
+          </a:lnRef>
+          <a:fillRef idx="1">
+            <a:schemeClr val="accent1"/>
+          </a:fillRef>
+          <a:effectRef idx="0">
+            <a:schemeClr val="accent1"/>
+          </a:effectRef>
+          <a:fontRef idx="minor">
+            <a:schemeClr val="lt1"/>
+          </a:fontRef>
+        </p:style>
+        <p:txBody>
+          <a:bodyPr rtlCol="0" anchor="ctr"/>
+          <a:lstStyle/>
+          <a:p>
+            <a:pPr algn="ctr"/>
+            <a:endParaRPr lang="en-US"/>
+          </a:p>
+        </p:txBody>
+      </p:sp>
+      <p:sp>
+        <p:nvSpPr>
+          <p:cNvPr id="14" name="Rounded Rectangle 13">
+            <a:extLst>
+              <a:ext uri="{FF2B5EF4-FFF2-40B4-BE49-F238E27FC236}">
+                <a16:creationId xmlns:a16="http://schemas.microsoft.com/office/drawing/2014/main" id="{9B8B3D9A-B1C7-B02D-E497-F8FBF089F71F}"/>
+              </a:ext>
+            </a:extLst>
+          </p:cNvPr>
+          <p:cNvSpPr/>
+          <p:nvPr/>
+        </p:nvSpPr>
+        <p:spPr>
+          <a:xfrm>
+            <a:off x="6570636" y="2315990"/>
+            <a:ext cx="218303" cy="4461092"/>
+          </a:xfrm>
+          <a:prstGeom prst="roundRect">
+            <a:avLst/>
+          </a:prstGeom>
+          <a:noFill/>
+          <a:ln w="38100">
+            <a:solidFill>
+              <a:srgbClr val="00B0F0"/>
+            </a:solidFill>
+          </a:ln>
+        </p:spPr>
+        <p:style>
+          <a:lnRef idx="2">
+            <a:schemeClr val="accent1">
+              <a:shade val="15000"/>
+            </a:schemeClr>
+          </a:lnRef>
+          <a:fillRef idx="1">
+            <a:schemeClr val="accent1"/>
+          </a:fillRef>
+          <a:effectRef idx="0">
+            <a:schemeClr val="accent1"/>
+          </a:effectRef>
+          <a:fontRef idx="minor">
+            <a:schemeClr val="lt1"/>
+          </a:fontRef>
+        </p:style>
+        <p:txBody>
+          <a:bodyPr rtlCol="0" anchor="ctr"/>
+          <a:lstStyle/>
+          <a:p>
+            <a:pPr algn="ctr"/>
+            <a:endParaRPr lang="en-US"/>
+          </a:p>
+        </p:txBody>
+      </p:sp>
+    </p:spTree>
+    <p:extLst>
+      <p:ext uri="{BB962C8B-B14F-4D97-AF65-F5344CB8AC3E}">
+        <p14:creationId xmlns:p14="http://schemas.microsoft.com/office/powerpoint/2010/main" val="1151543127"/>
+      </p:ext>
+    </p:extLst>
+  </p:cSld>
+  <p:clrMapOvr>
+    <a:masterClrMapping/>
+  </p:clrMapOvr>
+</p:sld>
+</file>
+
+<file path=ppt/slides/slide12.xml><?xml version="1.0" encoding="utf-8"?>
+<p:sld xmlns:a="http://schemas.openxmlformats.org/drawingml/2006/main" xmlns:r="http://schemas.openxmlformats.org/officeDocument/2006/relationships" xmlns:p="http://schemas.openxmlformats.org/presentationml/2006/main">
+  <p:cSld>
+    <p:spTree>
+      <p:nvGrpSpPr>
+        <p:cNvPr id="1" name="">
+          <a:extLst>
+            <a:ext uri="{FF2B5EF4-FFF2-40B4-BE49-F238E27FC236}">
+              <a16:creationId xmlns:a16="http://schemas.microsoft.com/office/drawing/2014/main" id="{69BE7484-C118-B77F-9F25-0CBCDB307637}"/>
+            </a:ext>
+          </a:extLst>
+        </p:cNvPr>
+        <p:cNvGrpSpPr/>
+        <p:nvPr/>
+      </p:nvGrpSpPr>
+      <p:grpSpPr>
+        <a:xfrm>
+          <a:off x="0" y="0"/>
+          <a:ext cx="0" cy="0"/>
+          <a:chOff x="0" y="0"/>
+          <a:chExt cx="0" cy="0"/>
+        </a:xfrm>
+      </p:grpSpPr>
+      <p:sp>
+        <p:nvSpPr>
+          <p:cNvPr id="2" name="Title 1">
+            <a:extLst>
+              <a:ext uri="{FF2B5EF4-FFF2-40B4-BE49-F238E27FC236}">
+                <a16:creationId xmlns:a16="http://schemas.microsoft.com/office/drawing/2014/main" id="{F46A6897-1FD8-CD66-9938-CE0A046DE782}"/>
+              </a:ext>
+            </a:extLst>
+          </p:cNvPr>
+          <p:cNvSpPr>
+            <a:spLocks noGrp="1"/>
+          </p:cNvSpPr>
+          <p:nvPr>
+            <p:ph type="title"/>
+          </p:nvPr>
+        </p:nvSpPr>
+        <p:spPr>
+          <a:xfrm>
+            <a:off x="838200" y="80918"/>
+            <a:ext cx="10515600" cy="648129"/>
+          </a:xfrm>
+        </p:spPr>
+        <p:txBody>
+          <a:bodyPr>
+            <a:normAutofit fontScale="90000"/>
+          </a:bodyPr>
+          <a:lstStyle/>
+          <a:p>
+            <a:r>
+              <a:rPr lang="en-US" dirty="0"/>
+              <a:t>Network attempt 1: WGCNA, gametophyte</a:t>
+            </a:r>
+          </a:p>
+        </p:txBody>
+      </p:sp>
+      <p:sp>
+        <p:nvSpPr>
+          <p:cNvPr id="4" name="AutoShape 2">
+            <a:extLst>
+              <a:ext uri="{FF2B5EF4-FFF2-40B4-BE49-F238E27FC236}">
+                <a16:creationId xmlns:a16="http://schemas.microsoft.com/office/drawing/2014/main" id="{E0AA1BE6-61EC-1C01-5D81-78B6C7BC679F}"/>
+              </a:ext>
+            </a:extLst>
+          </p:cNvPr>
+          <p:cNvSpPr>
+            <a:spLocks noChangeAspect="1" noChangeArrowheads="1"/>
+          </p:cNvSpPr>
+          <p:nvPr/>
+        </p:nvSpPr>
+        <p:spPr bwMode="auto">
+          <a:xfrm>
+            <a:off x="5943600" y="3276600"/>
+            <a:ext cx="304800" cy="304800"/>
+          </a:xfrm>
+          <a:prstGeom prst="rect">
+            <a:avLst/>
+          </a:prstGeom>
+          <a:noFill/>
+          <a:extLst>
+            <a:ext uri="{909E8E84-426E-40DD-AFC4-6F175D3DCCD1}">
+              <a14:hiddenFill xmlns:a14="http://schemas.microsoft.com/office/drawing/2010/main">
+                <a:solidFill>
+                  <a:srgbClr val="FFFFFF"/>
+                </a:solidFill>
+              </a14:hiddenFill>
+            </a:ext>
+          </a:extLst>
+        </p:spPr>
+        <p:txBody>
+          <a:bodyPr vert="horz" wrap="square" lIns="91440" tIns="45720" rIns="91440" bIns="45720" numCol="1" anchor="t" anchorCtr="0" compatLnSpc="1">
+            <a:prstTxWarp prst="textNoShape">
+              <a:avLst/>
+            </a:prstTxWarp>
+          </a:bodyPr>
+          <a:lstStyle/>
+          <a:p>
+            <a:endParaRPr lang="en-US"/>
+          </a:p>
+        </p:txBody>
+      </p:sp>
+      <p:sp>
+        <p:nvSpPr>
+          <p:cNvPr id="5" name="AutoShape 4">
+            <a:extLst>
+              <a:ext uri="{FF2B5EF4-FFF2-40B4-BE49-F238E27FC236}">
+                <a16:creationId xmlns:a16="http://schemas.microsoft.com/office/drawing/2014/main" id="{605C7EE7-7E62-62F8-6D97-5EC31786BD9B}"/>
+              </a:ext>
+            </a:extLst>
+          </p:cNvPr>
+          <p:cNvSpPr>
+            <a:spLocks noChangeAspect="1" noChangeArrowheads="1"/>
+          </p:cNvSpPr>
+          <p:nvPr/>
+        </p:nvSpPr>
+        <p:spPr bwMode="auto">
+          <a:xfrm>
+            <a:off x="6096000" y="3429000"/>
+            <a:ext cx="304800" cy="304800"/>
+          </a:xfrm>
+          <a:prstGeom prst="rect">
+            <a:avLst/>
+          </a:prstGeom>
+          <a:noFill/>
+          <a:extLst>
+            <a:ext uri="{909E8E84-426E-40DD-AFC4-6F175D3DCCD1}">
+              <a14:hiddenFill xmlns:a14="http://schemas.microsoft.com/office/drawing/2010/main">
+                <a:solidFill>
+                  <a:srgbClr val="FFFFFF"/>
+                </a:solidFill>
+              </a14:hiddenFill>
+            </a:ext>
+          </a:extLst>
+        </p:spPr>
+        <p:txBody>
+          <a:bodyPr vert="horz" wrap="square" lIns="91440" tIns="45720" rIns="91440" bIns="45720" numCol="1" anchor="t" anchorCtr="0" compatLnSpc="1">
+            <a:prstTxWarp prst="textNoShape">
+              <a:avLst/>
+            </a:prstTxWarp>
+          </a:bodyPr>
+          <a:lstStyle/>
+          <a:p>
+            <a:endParaRPr lang="en-US"/>
+          </a:p>
+        </p:txBody>
+      </p:sp>
+      <p:sp>
+        <p:nvSpPr>
+          <p:cNvPr id="6" name="AutoShape 6">
+            <a:extLst>
+              <a:ext uri="{FF2B5EF4-FFF2-40B4-BE49-F238E27FC236}">
+                <a16:creationId xmlns:a16="http://schemas.microsoft.com/office/drawing/2014/main" id="{2BFE5D49-48EF-1362-1210-CC80C64273E7}"/>
+              </a:ext>
+            </a:extLst>
+          </p:cNvPr>
+          <p:cNvSpPr>
+            <a:spLocks noChangeAspect="1" noChangeArrowheads="1"/>
+          </p:cNvSpPr>
+          <p:nvPr/>
+        </p:nvSpPr>
+        <p:spPr bwMode="auto">
+          <a:xfrm>
+            <a:off x="4114800" y="1447800"/>
+            <a:ext cx="2438400" cy="2438400"/>
+          </a:xfrm>
+          <a:prstGeom prst="rect">
+            <a:avLst/>
+          </a:prstGeom>
+          <a:noFill/>
+          <a:extLst>
+            <a:ext uri="{909E8E84-426E-40DD-AFC4-6F175D3DCCD1}">
+              <a14:hiddenFill xmlns:a14="http://schemas.microsoft.com/office/drawing/2010/main">
+                <a:solidFill>
+                  <a:srgbClr val="FFFFFF"/>
+                </a:solidFill>
+              </a14:hiddenFill>
+            </a:ext>
+          </a:extLst>
+        </p:spPr>
+        <p:txBody>
+          <a:bodyPr vert="horz" wrap="square" lIns="91440" tIns="45720" rIns="91440" bIns="45720" numCol="1" anchor="t" anchorCtr="0" compatLnSpc="1">
+            <a:prstTxWarp prst="textNoShape">
+              <a:avLst/>
+            </a:prstTxWarp>
+          </a:bodyPr>
+          <a:lstStyle/>
+          <a:p>
+            <a:endParaRPr lang="en-US"/>
+          </a:p>
+        </p:txBody>
+      </p:sp>
+      <p:sp>
+        <p:nvSpPr>
+          <p:cNvPr id="7" name="AutoShape 8">
+            <a:extLst>
+              <a:ext uri="{FF2B5EF4-FFF2-40B4-BE49-F238E27FC236}">
+                <a16:creationId xmlns:a16="http://schemas.microsoft.com/office/drawing/2014/main" id="{60D3FA03-F9C4-53A8-FC92-7D5EAA2CFB9D}"/>
+              </a:ext>
+            </a:extLst>
+          </p:cNvPr>
+          <p:cNvSpPr>
+            <a:spLocks noChangeAspect="1" noChangeArrowheads="1"/>
+          </p:cNvSpPr>
+          <p:nvPr/>
+        </p:nvSpPr>
+        <p:spPr bwMode="auto">
+          <a:xfrm>
+            <a:off x="6248400" y="1213022"/>
+            <a:ext cx="2673178" cy="2673178"/>
+          </a:xfrm>
+          <a:prstGeom prst="rect">
+            <a:avLst/>
+          </a:prstGeom>
+          <a:noFill/>
+          <a:extLst>
+            <a:ext uri="{909E8E84-426E-40DD-AFC4-6F175D3DCCD1}">
+              <a14:hiddenFill xmlns:a14="http://schemas.microsoft.com/office/drawing/2010/main">
+                <a:solidFill>
+                  <a:srgbClr val="FFFFFF"/>
+                </a:solidFill>
+              </a14:hiddenFill>
+            </a:ext>
+          </a:extLst>
+        </p:spPr>
+        <p:txBody>
+          <a:bodyPr vert="horz" wrap="square" lIns="91440" tIns="45720" rIns="91440" bIns="45720" numCol="1" anchor="t" anchorCtr="0" compatLnSpc="1">
+            <a:prstTxWarp prst="textNoShape">
+              <a:avLst/>
+            </a:prstTxWarp>
+          </a:bodyPr>
+          <a:lstStyle/>
+          <a:p>
+            <a:endParaRPr lang="en-US"/>
+          </a:p>
+        </p:txBody>
+      </p:sp>
+      <p:sp>
+        <p:nvSpPr>
+          <p:cNvPr id="10" name="TextBox 9">
+            <a:extLst>
+              <a:ext uri="{FF2B5EF4-FFF2-40B4-BE49-F238E27FC236}">
+                <a16:creationId xmlns:a16="http://schemas.microsoft.com/office/drawing/2014/main" id="{2C517800-456D-04D5-33F8-8297903740C8}"/>
+              </a:ext>
+            </a:extLst>
+          </p:cNvPr>
+          <p:cNvSpPr txBox="1"/>
+          <p:nvPr/>
+        </p:nvSpPr>
+        <p:spPr>
+          <a:xfrm>
+            <a:off x="10132541" y="506627"/>
+            <a:ext cx="1915297" cy="3416320"/>
+          </a:xfrm>
+          <a:prstGeom prst="rect">
+            <a:avLst/>
+          </a:prstGeom>
+          <a:noFill/>
+        </p:spPr>
+        <p:txBody>
+          <a:bodyPr wrap="square" rtlCol="0">
+            <a:spAutoFit/>
+          </a:bodyPr>
+          <a:lstStyle/>
+          <a:p>
+            <a:r>
+              <a:rPr lang="en-US" dirty="0"/>
+              <a:t>Each “color” is a module</a:t>
+            </a:r>
+          </a:p>
+          <a:p>
+            <a:endParaRPr lang="en-US" dirty="0"/>
+          </a:p>
+          <a:p>
+            <a:r>
+              <a:rPr lang="en-US" dirty="0"/>
+              <a:t>Y-axis is first PC of expression of that module</a:t>
+            </a:r>
+          </a:p>
+          <a:p>
+            <a:endParaRPr lang="en-US" dirty="0"/>
+          </a:p>
+          <a:p>
+            <a:r>
+              <a:rPr lang="en-US" dirty="0"/>
+              <a:t>LFY1 is in TURQUOISE</a:t>
+            </a:r>
+          </a:p>
+          <a:p>
+            <a:endParaRPr lang="en-US" dirty="0"/>
+          </a:p>
+          <a:p>
+            <a:r>
+              <a:rPr lang="en-US" dirty="0"/>
+              <a:t>LFY2 is in BROWN</a:t>
+            </a:r>
+          </a:p>
+        </p:txBody>
+      </p:sp>
+      <p:pic>
+        <p:nvPicPr>
+          <p:cNvPr id="12" name="Picture 11">
+            <a:extLst>
+              <a:ext uri="{FF2B5EF4-FFF2-40B4-BE49-F238E27FC236}">
+                <a16:creationId xmlns:a16="http://schemas.microsoft.com/office/drawing/2014/main" id="{BB351EAF-E49E-6F7B-5811-29CC0B8E867A}"/>
+              </a:ext>
+            </a:extLst>
+          </p:cNvPr>
+          <p:cNvPicPr>
+            <a:picLocks noChangeAspect="1"/>
+          </p:cNvPicPr>
+          <p:nvPr/>
+        </p:nvPicPr>
+        <p:blipFill>
+          <a:blip r:embed="rId2"/>
+          <a:stretch>
+            <a:fillRect/>
+          </a:stretch>
+        </p:blipFill>
+        <p:spPr>
+          <a:xfrm>
+            <a:off x="144161" y="729046"/>
+            <a:ext cx="9765057" cy="6048035"/>
+          </a:xfrm>
+          <a:prstGeom prst="rect">
+            <a:avLst/>
+          </a:prstGeom>
+        </p:spPr>
+      </p:pic>
+      <p:sp>
+        <p:nvSpPr>
+          <p:cNvPr id="13" name="Rounded Rectangle 12">
+            <a:extLst>
+              <a:ext uri="{FF2B5EF4-FFF2-40B4-BE49-F238E27FC236}">
+                <a16:creationId xmlns:a16="http://schemas.microsoft.com/office/drawing/2014/main" id="{407D2C17-A9C9-B010-BE20-B8227C6EE2DD}"/>
+              </a:ext>
+            </a:extLst>
+          </p:cNvPr>
+          <p:cNvSpPr/>
+          <p:nvPr/>
+        </p:nvSpPr>
+        <p:spPr>
+          <a:xfrm>
+            <a:off x="4618817" y="729044"/>
+            <a:ext cx="1915297" cy="1216713"/>
+          </a:xfrm>
+          <a:prstGeom prst="roundRect">
+            <a:avLst/>
+          </a:prstGeom>
+          <a:noFill/>
+          <a:ln w="38100">
+            <a:solidFill>
+              <a:srgbClr val="FF0000"/>
+            </a:solidFill>
+          </a:ln>
+        </p:spPr>
+        <p:style>
+          <a:lnRef idx="2">
+            <a:schemeClr val="accent1">
+              <a:shade val="15000"/>
+            </a:schemeClr>
+          </a:lnRef>
+          <a:fillRef idx="1">
+            <a:schemeClr val="accent1"/>
+          </a:fillRef>
+          <a:effectRef idx="0">
+            <a:schemeClr val="accent1"/>
+          </a:effectRef>
+          <a:fontRef idx="minor">
+            <a:schemeClr val="lt1"/>
+          </a:fontRef>
+        </p:style>
+        <p:txBody>
+          <a:bodyPr rtlCol="0" anchor="ctr"/>
+          <a:lstStyle/>
+          <a:p>
+            <a:pPr algn="ctr"/>
+            <a:endParaRPr lang="en-US"/>
+          </a:p>
+        </p:txBody>
+      </p:sp>
+      <p:sp>
+        <p:nvSpPr>
+          <p:cNvPr id="14" name="Rounded Rectangle 13">
+            <a:extLst>
+              <a:ext uri="{FF2B5EF4-FFF2-40B4-BE49-F238E27FC236}">
+                <a16:creationId xmlns:a16="http://schemas.microsoft.com/office/drawing/2014/main" id="{59BA3490-CFC3-A466-9360-0E22E8E51CAB}"/>
+              </a:ext>
+            </a:extLst>
+          </p:cNvPr>
+          <p:cNvSpPr/>
+          <p:nvPr/>
+        </p:nvSpPr>
+        <p:spPr>
+          <a:xfrm>
+            <a:off x="656417" y="4315761"/>
+            <a:ext cx="1915297" cy="1216713"/>
+          </a:xfrm>
+          <a:prstGeom prst="roundRect">
+            <a:avLst/>
+          </a:prstGeom>
+          <a:noFill/>
+          <a:ln w="38100">
+            <a:solidFill>
+              <a:srgbClr val="00B0F0"/>
+            </a:solidFill>
+          </a:ln>
+        </p:spPr>
+        <p:style>
+          <a:lnRef idx="2">
+            <a:schemeClr val="accent1">
+              <a:shade val="15000"/>
+            </a:schemeClr>
+          </a:lnRef>
+          <a:fillRef idx="1">
+            <a:schemeClr val="accent1"/>
+          </a:fillRef>
+          <a:effectRef idx="0">
+            <a:schemeClr val="accent1"/>
+          </a:effectRef>
+          <a:fontRef idx="minor">
+            <a:schemeClr val="lt1"/>
+          </a:fontRef>
+        </p:style>
+        <p:txBody>
+          <a:bodyPr rtlCol="0" anchor="ctr"/>
+          <a:lstStyle/>
+          <a:p>
+            <a:pPr algn="ctr"/>
+            <a:endParaRPr lang="en-US"/>
+          </a:p>
+        </p:txBody>
+      </p:sp>
+    </p:spTree>
+    <p:extLst>
+      <p:ext uri="{BB962C8B-B14F-4D97-AF65-F5344CB8AC3E}">
+        <p14:creationId xmlns:p14="http://schemas.microsoft.com/office/powerpoint/2010/main" val="2256113573"/>
+      </p:ext>
+    </p:extLst>
+  </p:cSld>
+  <p:clrMapOvr>
+    <a:masterClrMapping/>
+  </p:clrMapOvr>
+</p:sld>
+</file>
+
+<file path=ppt/slides/slide13.xml><?xml version="1.0" encoding="utf-8"?>
+<p:sld xmlns:a="http://schemas.openxmlformats.org/drawingml/2006/main" xmlns:r="http://schemas.openxmlformats.org/officeDocument/2006/relationships" xmlns:p="http://schemas.openxmlformats.org/presentationml/2006/main">
+  <p:cSld>
+    <p:spTree>
+      <p:nvGrpSpPr>
+        <p:cNvPr id="1" name="">
+          <a:extLst>
+            <a:ext uri="{FF2B5EF4-FFF2-40B4-BE49-F238E27FC236}">
               <a16:creationId xmlns:a16="http://schemas.microsoft.com/office/drawing/2014/main" id="{FDD19AA3-7D8F-83EC-A28B-9471F7C7C80E}"/>
             </a:ext>
           </a:extLst>
@@ -3676,7 +5021,7 @@
         <p:spPr>
           <a:xfrm>
             <a:off x="10132541" y="506627"/>
-            <a:ext cx="1915297" cy="2585323"/>
+            <a:ext cx="1915297" cy="2308324"/>
           </a:xfrm>
           <a:prstGeom prst="rect">
             <a:avLst/>
@@ -3700,44 +5045,26 @@
           <a:p>
             <a:r>
               <a:rPr lang="en-US" dirty="0"/>
-              <a:t>LFY1 is in </a:t>
-            </a:r>
-            <a:r>
-              <a:rPr lang="en-US" dirty="0" err="1"/>
-              <a:t>MEblue</a:t>
-            </a:r>
+              <a:t>LFY1 is in TURQUOISE</a:t>
+            </a:r>
+          </a:p>
+          <a:p>
+            <a:endParaRPr lang="en-US" dirty="0"/>
+          </a:p>
+          <a:p>
             <a:r>
               <a:rPr lang="en-US" dirty="0"/>
-              <a:t> &amp; alternative transcript is in </a:t>
-            </a:r>
-            <a:r>
-              <a:rPr lang="en-US" dirty="0" err="1"/>
-              <a:t>MEturquoise</a:t>
-            </a:r>
-            <a:endParaRPr lang="en-US" dirty="0"/>
-          </a:p>
-          <a:p>
-            <a:endParaRPr lang="en-US" dirty="0"/>
-          </a:p>
-          <a:p>
-            <a:r>
-              <a:rPr lang="en-US" dirty="0"/>
-              <a:t>LFY2 is in </a:t>
-            </a:r>
-            <a:r>
-              <a:rPr lang="en-US" dirty="0" err="1"/>
-              <a:t>MEblue</a:t>
-            </a:r>
-            <a:endParaRPr lang="en-US" dirty="0"/>
+              <a:t>LFY2 is in BROWN</a:t>
+            </a:r>
           </a:p>
         </p:txBody>
       </p:sp>
       <p:pic>
         <p:nvPicPr>
-          <p:cNvPr id="8" name="Picture 7">
-            <a:extLst>
-              <a:ext uri="{FF2B5EF4-FFF2-40B4-BE49-F238E27FC236}">
-                <a16:creationId xmlns:a16="http://schemas.microsoft.com/office/drawing/2014/main" id="{F42FF836-6633-DE34-52DC-1B666435A127}"/>
+          <p:cNvPr id="12" name="Picture 11">
+            <a:extLst>
+              <a:ext uri="{FF2B5EF4-FFF2-40B4-BE49-F238E27FC236}">
+                <a16:creationId xmlns:a16="http://schemas.microsoft.com/office/drawing/2014/main" id="{62FF9F8B-2529-29D3-9DF9-33ADB5954F9A}"/>
               </a:ext>
             </a:extLst>
           </p:cNvPr>
@@ -3754,18 +5081,251 @@
         </p:blipFill>
         <p:spPr>
           <a:xfrm>
-            <a:off x="177112" y="729046"/>
-            <a:ext cx="9565347" cy="5918889"/>
+            <a:off x="144161" y="614916"/>
+            <a:ext cx="9711245" cy="6009168"/>
           </a:xfrm>
           <a:prstGeom prst="rect">
             <a:avLst/>
           </a:prstGeom>
         </p:spPr>
       </p:pic>
+      <p:sp>
+        <p:nvSpPr>
+          <p:cNvPr id="13" name="Rounded Rectangle 12">
+            <a:extLst>
+              <a:ext uri="{FF2B5EF4-FFF2-40B4-BE49-F238E27FC236}">
+                <a16:creationId xmlns:a16="http://schemas.microsoft.com/office/drawing/2014/main" id="{8E31ACD0-7143-CFE5-A895-8A075A437C3F}"/>
+              </a:ext>
+            </a:extLst>
+          </p:cNvPr>
+          <p:cNvSpPr/>
+          <p:nvPr/>
+        </p:nvSpPr>
+        <p:spPr>
+          <a:xfrm>
+            <a:off x="6215449" y="2158409"/>
+            <a:ext cx="490151" cy="4704907"/>
+          </a:xfrm>
+          <a:prstGeom prst="roundRect">
+            <a:avLst/>
+          </a:prstGeom>
+          <a:noFill/>
+          <a:ln w="38100">
+            <a:solidFill>
+              <a:srgbClr val="FF0000"/>
+            </a:solidFill>
+          </a:ln>
+        </p:spPr>
+        <p:style>
+          <a:lnRef idx="2">
+            <a:schemeClr val="accent1">
+              <a:shade val="15000"/>
+            </a:schemeClr>
+          </a:lnRef>
+          <a:fillRef idx="1">
+            <a:schemeClr val="accent1"/>
+          </a:fillRef>
+          <a:effectRef idx="0">
+            <a:schemeClr val="accent1"/>
+          </a:effectRef>
+          <a:fontRef idx="minor">
+            <a:schemeClr val="lt1"/>
+          </a:fontRef>
+        </p:style>
+        <p:txBody>
+          <a:bodyPr rtlCol="0" anchor="ctr"/>
+          <a:lstStyle/>
+          <a:p>
+            <a:pPr algn="ctr"/>
+            <a:endParaRPr lang="en-US"/>
+          </a:p>
+        </p:txBody>
+      </p:sp>
+      <p:sp>
+        <p:nvSpPr>
+          <p:cNvPr id="14" name="Rounded Rectangle 13">
+            <a:extLst>
+              <a:ext uri="{FF2B5EF4-FFF2-40B4-BE49-F238E27FC236}">
+                <a16:creationId xmlns:a16="http://schemas.microsoft.com/office/drawing/2014/main" id="{8BD1E5FF-0EEC-148D-50D9-98D31951D40D}"/>
+              </a:ext>
+            </a:extLst>
+          </p:cNvPr>
+          <p:cNvSpPr/>
+          <p:nvPr/>
+        </p:nvSpPr>
+        <p:spPr>
+          <a:xfrm>
+            <a:off x="3271476" y="2153093"/>
+            <a:ext cx="490151" cy="4704907"/>
+          </a:xfrm>
+          <a:prstGeom prst="roundRect">
+            <a:avLst/>
+          </a:prstGeom>
+          <a:noFill/>
+          <a:ln w="38100">
+            <a:solidFill>
+              <a:srgbClr val="00B0F0"/>
+            </a:solidFill>
+          </a:ln>
+        </p:spPr>
+        <p:style>
+          <a:lnRef idx="2">
+            <a:schemeClr val="accent1">
+              <a:shade val="15000"/>
+            </a:schemeClr>
+          </a:lnRef>
+          <a:fillRef idx="1">
+            <a:schemeClr val="accent1"/>
+          </a:fillRef>
+          <a:effectRef idx="0">
+            <a:schemeClr val="accent1"/>
+          </a:effectRef>
+          <a:fontRef idx="minor">
+            <a:schemeClr val="lt1"/>
+          </a:fontRef>
+        </p:style>
+        <p:txBody>
+          <a:bodyPr rtlCol="0" anchor="ctr"/>
+          <a:lstStyle/>
+          <a:p>
+            <a:pPr algn="ctr"/>
+            <a:endParaRPr lang="en-US"/>
+          </a:p>
+        </p:txBody>
+      </p:sp>
     </p:spTree>
     <p:extLst>
       <p:ext uri="{BB962C8B-B14F-4D97-AF65-F5344CB8AC3E}">
         <p14:creationId xmlns:p14="http://schemas.microsoft.com/office/powerpoint/2010/main" val="1287651465"/>
+      </p:ext>
+    </p:extLst>
+  </p:cSld>
+  <p:clrMapOvr>
+    <a:masterClrMapping/>
+  </p:clrMapOvr>
+</p:sld>
+</file>
+
+<file path=ppt/slides/slide14.xml><?xml version="1.0" encoding="utf-8"?>
+<p:sld xmlns:a="http://schemas.openxmlformats.org/drawingml/2006/main" xmlns:r="http://schemas.openxmlformats.org/officeDocument/2006/relationships" xmlns:p="http://schemas.openxmlformats.org/presentationml/2006/main">
+  <p:cSld>
+    <p:spTree>
+      <p:nvGrpSpPr>
+        <p:cNvPr id="1" name=""/>
+        <p:cNvGrpSpPr/>
+        <p:nvPr/>
+      </p:nvGrpSpPr>
+      <p:grpSpPr>
+        <a:xfrm>
+          <a:off x="0" y="0"/>
+          <a:ext cx="0" cy="0"/>
+          <a:chOff x="0" y="0"/>
+          <a:chExt cx="0" cy="0"/>
+        </a:xfrm>
+      </p:grpSpPr>
+      <p:sp>
+        <p:nvSpPr>
+          <p:cNvPr id="2" name="Title 1">
+            <a:extLst>
+              <a:ext uri="{FF2B5EF4-FFF2-40B4-BE49-F238E27FC236}">
+                <a16:creationId xmlns:a16="http://schemas.microsoft.com/office/drawing/2014/main" id="{264EE1B4-8E5E-D62B-7684-76ED53A290AB}"/>
+              </a:ext>
+            </a:extLst>
+          </p:cNvPr>
+          <p:cNvSpPr>
+            <a:spLocks noGrp="1"/>
+          </p:cNvSpPr>
+          <p:nvPr>
+            <p:ph type="title"/>
+          </p:nvPr>
+        </p:nvSpPr>
+        <p:spPr>
+          <a:xfrm>
+            <a:off x="838200" y="365125"/>
+            <a:ext cx="10515600" cy="740661"/>
+          </a:xfrm>
+        </p:spPr>
+        <p:txBody>
+          <a:bodyPr/>
+          <a:lstStyle/>
+          <a:p>
+            <a:r>
+              <a:rPr lang="en-US" dirty="0"/>
+              <a:t>Next Steps</a:t>
+            </a:r>
+          </a:p>
+        </p:txBody>
+      </p:sp>
+      <p:sp>
+        <p:nvSpPr>
+          <p:cNvPr id="3" name="Content Placeholder 2">
+            <a:extLst>
+              <a:ext uri="{FF2B5EF4-FFF2-40B4-BE49-F238E27FC236}">
+                <a16:creationId xmlns:a16="http://schemas.microsoft.com/office/drawing/2014/main" id="{8F0DC10F-99C3-BC9E-BF36-7C8F66676D83}"/>
+              </a:ext>
+            </a:extLst>
+          </p:cNvPr>
+          <p:cNvSpPr>
+            <a:spLocks noGrp="1"/>
+          </p:cNvSpPr>
+          <p:nvPr>
+            <p:ph idx="1"/>
+          </p:nvPr>
+        </p:nvSpPr>
+        <p:spPr>
+          <a:xfrm>
+            <a:off x="838200" y="1244009"/>
+            <a:ext cx="10515600" cy="4932954"/>
+          </a:xfrm>
+        </p:spPr>
+        <p:txBody>
+          <a:bodyPr/>
+          <a:lstStyle/>
+          <a:p>
+            <a:r>
+              <a:rPr lang="en-US" dirty="0"/>
+              <a:t>Gene Ontology (GO) categories for each module</a:t>
+            </a:r>
+          </a:p>
+          <a:p>
+            <a:r>
+              <a:rPr lang="en-US" dirty="0"/>
+              <a:t>Enriched promoter motifs for each modules</a:t>
+            </a:r>
+          </a:p>
+          <a:p>
+            <a:r>
+              <a:rPr lang="en-US" dirty="0"/>
+              <a:t>Build a mutual rank (MR) network</a:t>
+            </a:r>
+          </a:p>
+          <a:p>
+            <a:pPr lvl="1"/>
+            <a:r>
+              <a:rPr lang="en-US" dirty="0"/>
+              <a:t>Rationale:</a:t>
+            </a:r>
+          </a:p>
+          <a:p>
+            <a:pPr lvl="2"/>
+            <a:r>
+              <a:rPr lang="en-US" dirty="0"/>
+              <a:t>Current LFY modules are very large many hundreds to thousands of genes</a:t>
+            </a:r>
+          </a:p>
+          <a:p>
+            <a:pPr lvl="2"/>
+            <a:r>
+              <a:rPr lang="en-US" dirty="0"/>
+              <a:t>A MR network will allow me to more easily identify LFYs’ closest connections</a:t>
+            </a:r>
+          </a:p>
+        </p:txBody>
+      </p:sp>
+    </p:spTree>
+    <p:extLst>
+      <p:ext uri="{BB962C8B-B14F-4D97-AF65-F5344CB8AC3E}">
+        <p14:creationId xmlns:p14="http://schemas.microsoft.com/office/powerpoint/2010/main" val="3176333086"/>
       </p:ext>
     </p:extLst>
   </p:cSld>
@@ -3977,7 +5537,7 @@
           <p:cNvPr id="2" name="Title 1">
             <a:extLst>
               <a:ext uri="{FF2B5EF4-FFF2-40B4-BE49-F238E27FC236}">
-                <a16:creationId xmlns:a16="http://schemas.microsoft.com/office/drawing/2014/main" id="{0463EF6A-158D-F806-4743-80F1BD73E005}"/>
+                <a16:creationId xmlns:a16="http://schemas.microsoft.com/office/drawing/2014/main" id="{B0357314-2286-5433-2B1C-CBD93B35F2BA}"/>
               </a:ext>
             </a:extLst>
           </p:cNvPr>
@@ -3988,48 +5548,54 @@
             <p:ph type="title"/>
           </p:nvPr>
         </p:nvSpPr>
-        <p:spPr/>
+        <p:spPr>
+          <a:xfrm>
+            <a:off x="838200" y="333227"/>
+            <a:ext cx="10515600" cy="676866"/>
+          </a:xfrm>
+        </p:spPr>
+        <p:txBody>
+          <a:bodyPr>
+            <a:normAutofit fontScale="90000"/>
+          </a:bodyPr>
+          <a:lstStyle/>
+          <a:p>
+            <a:r>
+              <a:rPr lang="en-US" dirty="0"/>
+              <a:t>Was I counting reads correctly? NO</a:t>
+            </a:r>
+          </a:p>
+        </p:txBody>
+      </p:sp>
+      <p:sp>
+        <p:nvSpPr>
+          <p:cNvPr id="3" name="Content Placeholder 2">
+            <a:extLst>
+              <a:ext uri="{FF2B5EF4-FFF2-40B4-BE49-F238E27FC236}">
+                <a16:creationId xmlns:a16="http://schemas.microsoft.com/office/drawing/2014/main" id="{ACE05BB2-1040-1121-02B8-44DC84496BA7}"/>
+              </a:ext>
+            </a:extLst>
+          </p:cNvPr>
+          <p:cNvSpPr>
+            <a:spLocks noGrp="1"/>
+          </p:cNvSpPr>
+          <p:nvPr>
+            <p:ph idx="1"/>
+          </p:nvPr>
+        </p:nvSpPr>
+        <p:spPr>
+          <a:xfrm>
+            <a:off x="838200" y="1137684"/>
+            <a:ext cx="10515600" cy="5039279"/>
+          </a:xfrm>
+        </p:spPr>
         <p:txBody>
           <a:bodyPr/>
           <a:lstStyle/>
           <a:p>
             <a:r>
               <a:rPr lang="en-US" dirty="0"/>
-              <a:t>Annotation follow-up</a:t>
-            </a:r>
-          </a:p>
-        </p:txBody>
-      </p:sp>
-      <p:sp>
-        <p:nvSpPr>
-          <p:cNvPr id="3" name="Content Placeholder 2">
-            <a:extLst>
-              <a:ext uri="{FF2B5EF4-FFF2-40B4-BE49-F238E27FC236}">
-                <a16:creationId xmlns:a16="http://schemas.microsoft.com/office/drawing/2014/main" id="{02591B2D-4B1B-0F1B-4476-6ABB26AA3BBD}"/>
-              </a:ext>
-            </a:extLst>
-          </p:cNvPr>
-          <p:cNvSpPr>
-            <a:spLocks noGrp="1"/>
-          </p:cNvSpPr>
-          <p:nvPr>
-            <p:ph idx="1"/>
-          </p:nvPr>
-        </p:nvSpPr>
-        <p:spPr/>
-        <p:txBody>
-          <a:bodyPr/>
-          <a:lstStyle/>
-          <a:p>
-            <a:r>
-              <a:rPr lang="en-US" dirty="0"/>
-              <a:t>I did realize that I was only counting reads that mapped to exons and therefore missing 5’ and 3’UTR. </a:t>
-            </a:r>
-          </a:p>
-          <a:p>
-            <a:r>
-              <a:rPr lang="en-US" dirty="0"/>
-              <a:t>Updated counts in process.</a:t>
+              <a:t>The annotation file has multiple isoforms and did not account for the correctly in my original analysis.  Now fixed.</a:t>
             </a:r>
           </a:p>
         </p:txBody>
@@ -4037,7 +5603,7 @@
     </p:spTree>
     <p:extLst>
       <p:ext uri="{BB962C8B-B14F-4D97-AF65-F5344CB8AC3E}">
-        <p14:creationId xmlns:p14="http://schemas.microsoft.com/office/powerpoint/2010/main" val="1769977057"/>
+        <p14:creationId xmlns:p14="http://schemas.microsoft.com/office/powerpoint/2010/main" val="1843026911"/>
       </p:ext>
     </p:extLst>
   </p:cSld>
@@ -4069,6 +5635,424 @@
           <p:cNvPr id="2" name="Title 1">
             <a:extLst>
               <a:ext uri="{FF2B5EF4-FFF2-40B4-BE49-F238E27FC236}">
+                <a16:creationId xmlns:a16="http://schemas.microsoft.com/office/drawing/2014/main" id="{16D887E0-34FC-04B2-40D9-6DAC836FC19F}"/>
+              </a:ext>
+            </a:extLst>
+          </p:cNvPr>
+          <p:cNvSpPr>
+            <a:spLocks noGrp="1"/>
+          </p:cNvSpPr>
+          <p:nvPr>
+            <p:ph type="title"/>
+          </p:nvPr>
+        </p:nvSpPr>
+        <p:spPr>
+          <a:xfrm>
+            <a:off x="838200" y="104912"/>
+            <a:ext cx="10515600" cy="1303758"/>
+          </a:xfrm>
+        </p:spPr>
+        <p:txBody>
+          <a:bodyPr>
+            <a:normAutofit/>
+          </a:bodyPr>
+          <a:lstStyle/>
+          <a:p>
+            <a:r>
+              <a:rPr lang="en-US" dirty="0"/>
+              <a:t>LFY1: old on left, new on right.  Pattern is similar but counts are more reasonable.</a:t>
+            </a:r>
+          </a:p>
+        </p:txBody>
+      </p:sp>
+      <p:pic>
+        <p:nvPicPr>
+          <p:cNvPr id="6" name="Picture 5">
+            <a:extLst>
+              <a:ext uri="{FF2B5EF4-FFF2-40B4-BE49-F238E27FC236}">
+                <a16:creationId xmlns:a16="http://schemas.microsoft.com/office/drawing/2014/main" id="{3A5E691C-9DAA-E146-8FB3-807D60CAC131}"/>
+              </a:ext>
+            </a:extLst>
+          </p:cNvPr>
+          <p:cNvPicPr>
+            <a:picLocks noChangeAspect="1"/>
+          </p:cNvPicPr>
+          <p:nvPr/>
+        </p:nvPicPr>
+        <p:blipFill>
+          <a:blip r:embed="rId2"/>
+          <a:stretch>
+            <a:fillRect/>
+          </a:stretch>
+        </p:blipFill>
+        <p:spPr>
+          <a:xfrm>
+            <a:off x="0" y="2248929"/>
+            <a:ext cx="6600393" cy="4071671"/>
+          </a:xfrm>
+          <a:prstGeom prst="rect">
+            <a:avLst/>
+          </a:prstGeom>
+        </p:spPr>
+      </p:pic>
+      <p:pic>
+        <p:nvPicPr>
+          <p:cNvPr id="5" name="Picture 4">
+            <a:extLst>
+              <a:ext uri="{FF2B5EF4-FFF2-40B4-BE49-F238E27FC236}">
+                <a16:creationId xmlns:a16="http://schemas.microsoft.com/office/drawing/2014/main" id="{805AEEEF-F60D-4861-C409-CC3AD01F2BF2}"/>
+              </a:ext>
+            </a:extLst>
+          </p:cNvPr>
+          <p:cNvPicPr>
+            <a:picLocks noChangeAspect="1"/>
+          </p:cNvPicPr>
+          <p:nvPr/>
+        </p:nvPicPr>
+        <p:blipFill>
+          <a:blip r:embed="rId3"/>
+          <a:stretch>
+            <a:fillRect/>
+          </a:stretch>
+        </p:blipFill>
+        <p:spPr>
+          <a:xfrm>
+            <a:off x="5591606" y="2248929"/>
+            <a:ext cx="6600393" cy="4071671"/>
+          </a:xfrm>
+          <a:prstGeom prst="rect">
+            <a:avLst/>
+          </a:prstGeom>
+        </p:spPr>
+      </p:pic>
+    </p:spTree>
+    <p:extLst>
+      <p:ext uri="{BB962C8B-B14F-4D97-AF65-F5344CB8AC3E}">
+        <p14:creationId xmlns:p14="http://schemas.microsoft.com/office/powerpoint/2010/main" val="2400691542"/>
+      </p:ext>
+    </p:extLst>
+  </p:cSld>
+  <p:clrMapOvr>
+    <a:masterClrMapping/>
+  </p:clrMapOvr>
+</p:sld>
+</file>
+
+<file path=ppt/slides/slide6.xml><?xml version="1.0" encoding="utf-8"?>
+<p:sld xmlns:a="http://schemas.openxmlformats.org/drawingml/2006/main" xmlns:r="http://schemas.openxmlformats.org/officeDocument/2006/relationships" xmlns:p="http://schemas.openxmlformats.org/presentationml/2006/main">
+  <p:cSld>
+    <p:spTree>
+      <p:nvGrpSpPr>
+        <p:cNvPr id="1" name="">
+          <a:extLst>
+            <a:ext uri="{FF2B5EF4-FFF2-40B4-BE49-F238E27FC236}">
+              <a16:creationId xmlns:a16="http://schemas.microsoft.com/office/drawing/2014/main" id="{FA137F76-0459-3073-9A5A-FA8993DF0DAB}"/>
+            </a:ext>
+          </a:extLst>
+        </p:cNvPr>
+        <p:cNvGrpSpPr/>
+        <p:nvPr/>
+      </p:nvGrpSpPr>
+      <p:grpSpPr>
+        <a:xfrm>
+          <a:off x="0" y="0"/>
+          <a:ext cx="0" cy="0"/>
+          <a:chOff x="0" y="0"/>
+          <a:chExt cx="0" cy="0"/>
+        </a:xfrm>
+      </p:grpSpPr>
+      <p:sp>
+        <p:nvSpPr>
+          <p:cNvPr id="2" name="Title 1">
+            <a:extLst>
+              <a:ext uri="{FF2B5EF4-FFF2-40B4-BE49-F238E27FC236}">
+                <a16:creationId xmlns:a16="http://schemas.microsoft.com/office/drawing/2014/main" id="{553E5FEF-F9AE-E526-97A5-CA19D14CEA3B}"/>
+              </a:ext>
+            </a:extLst>
+          </p:cNvPr>
+          <p:cNvSpPr>
+            <a:spLocks noGrp="1"/>
+          </p:cNvSpPr>
+          <p:nvPr>
+            <p:ph type="title"/>
+          </p:nvPr>
+        </p:nvSpPr>
+        <p:spPr>
+          <a:xfrm>
+            <a:off x="838200" y="104912"/>
+            <a:ext cx="10515600" cy="1303758"/>
+          </a:xfrm>
+        </p:spPr>
+        <p:txBody>
+          <a:bodyPr>
+            <a:normAutofit/>
+          </a:bodyPr>
+          <a:lstStyle/>
+          <a:p>
+            <a:r>
+              <a:rPr lang="en-US" dirty="0"/>
+              <a:t>LFY2: old on left, new on right.  Pattern is similar but counts are more reasonable.</a:t>
+            </a:r>
+          </a:p>
+        </p:txBody>
+      </p:sp>
+      <p:pic>
+        <p:nvPicPr>
+          <p:cNvPr id="4" name="Picture 3" descr="A graph of different colored bars&#10;&#10;AI-generated content may be incorrect.">
+            <a:extLst>
+              <a:ext uri="{FF2B5EF4-FFF2-40B4-BE49-F238E27FC236}">
+                <a16:creationId xmlns:a16="http://schemas.microsoft.com/office/drawing/2014/main" id="{89F32E91-8A19-AB92-94DA-13E2AA9AB3B1}"/>
+              </a:ext>
+            </a:extLst>
+          </p:cNvPr>
+          <p:cNvPicPr>
+            <a:picLocks noChangeAspect="1"/>
+          </p:cNvPicPr>
+          <p:nvPr/>
+        </p:nvPicPr>
+        <p:blipFill>
+          <a:blip r:embed="rId2"/>
+          <a:stretch>
+            <a:fillRect/>
+          </a:stretch>
+        </p:blipFill>
+        <p:spPr>
+          <a:xfrm>
+            <a:off x="0" y="2498473"/>
+            <a:ext cx="6314303" cy="3895187"/>
+          </a:xfrm>
+          <a:prstGeom prst="rect">
+            <a:avLst/>
+          </a:prstGeom>
+        </p:spPr>
+      </p:pic>
+      <p:pic>
+        <p:nvPicPr>
+          <p:cNvPr id="8" name="Picture 7">
+            <a:extLst>
+              <a:ext uri="{FF2B5EF4-FFF2-40B4-BE49-F238E27FC236}">
+                <a16:creationId xmlns:a16="http://schemas.microsoft.com/office/drawing/2014/main" id="{4554285F-66C1-DC9D-B2BF-28FE133DB4BD}"/>
+              </a:ext>
+            </a:extLst>
+          </p:cNvPr>
+          <p:cNvPicPr>
+            <a:picLocks noChangeAspect="1"/>
+          </p:cNvPicPr>
+          <p:nvPr/>
+        </p:nvPicPr>
+        <p:blipFill>
+          <a:blip r:embed="rId3"/>
+          <a:stretch>
+            <a:fillRect/>
+          </a:stretch>
+        </p:blipFill>
+        <p:spPr>
+          <a:xfrm>
+            <a:off x="5312924" y="2425612"/>
+            <a:ext cx="6879075" cy="4243585"/>
+          </a:xfrm>
+          <a:prstGeom prst="rect">
+            <a:avLst/>
+          </a:prstGeom>
+        </p:spPr>
+      </p:pic>
+    </p:spTree>
+    <p:extLst>
+      <p:ext uri="{BB962C8B-B14F-4D97-AF65-F5344CB8AC3E}">
+        <p14:creationId xmlns:p14="http://schemas.microsoft.com/office/powerpoint/2010/main" val="1592826605"/>
+      </p:ext>
+    </p:extLst>
+  </p:cSld>
+  <p:clrMapOvr>
+    <a:masterClrMapping/>
+  </p:clrMapOvr>
+</p:sld>
+</file>
+
+<file path=ppt/slides/slide7.xml><?xml version="1.0" encoding="utf-8"?>
+<p:sld xmlns:a="http://schemas.openxmlformats.org/drawingml/2006/main" xmlns:r="http://schemas.openxmlformats.org/officeDocument/2006/relationships" xmlns:p="http://schemas.openxmlformats.org/presentationml/2006/main">
+  <p:cSld>
+    <p:spTree>
+      <p:nvGrpSpPr>
+        <p:cNvPr id="1" name="">
+          <a:extLst>
+            <a:ext uri="{FF2B5EF4-FFF2-40B4-BE49-F238E27FC236}">
+              <a16:creationId xmlns:a16="http://schemas.microsoft.com/office/drawing/2014/main" id="{B18E918B-5122-5729-4754-C7E76D44EA71}"/>
+            </a:ext>
+          </a:extLst>
+        </p:cNvPr>
+        <p:cNvGrpSpPr/>
+        <p:nvPr/>
+      </p:nvGrpSpPr>
+      <p:grpSpPr>
+        <a:xfrm>
+          <a:off x="0" y="0"/>
+          <a:ext cx="0" cy="0"/>
+          <a:chOff x="0" y="0"/>
+          <a:chExt cx="0" cy="0"/>
+        </a:xfrm>
+      </p:grpSpPr>
+      <p:pic>
+        <p:nvPicPr>
+          <p:cNvPr id="3" name="Picture 2">
+            <a:extLst>
+              <a:ext uri="{FF2B5EF4-FFF2-40B4-BE49-F238E27FC236}">
+                <a16:creationId xmlns:a16="http://schemas.microsoft.com/office/drawing/2014/main" id="{AC1D5FE8-8E2C-1867-1704-22D87B25DC86}"/>
+              </a:ext>
+            </a:extLst>
+          </p:cNvPr>
+          <p:cNvPicPr>
+            <a:picLocks noChangeAspect="1"/>
+          </p:cNvPicPr>
+          <p:nvPr/>
+        </p:nvPicPr>
+        <p:blipFill>
+          <a:blip r:embed="rId2"/>
+          <a:stretch>
+            <a:fillRect/>
+          </a:stretch>
+        </p:blipFill>
+        <p:spPr>
+          <a:xfrm>
+            <a:off x="0" y="2248929"/>
+            <a:ext cx="6600393" cy="4071671"/>
+          </a:xfrm>
+          <a:prstGeom prst="rect">
+            <a:avLst/>
+          </a:prstGeom>
+        </p:spPr>
+      </p:pic>
+      <p:sp>
+        <p:nvSpPr>
+          <p:cNvPr id="2" name="Title 1">
+            <a:extLst>
+              <a:ext uri="{FF2B5EF4-FFF2-40B4-BE49-F238E27FC236}">
+                <a16:creationId xmlns:a16="http://schemas.microsoft.com/office/drawing/2014/main" id="{61947447-4907-B1A6-1EE9-CF4DBF5958E6}"/>
+              </a:ext>
+            </a:extLst>
+          </p:cNvPr>
+          <p:cNvSpPr>
+            <a:spLocks noGrp="1"/>
+          </p:cNvSpPr>
+          <p:nvPr>
+            <p:ph type="title"/>
+          </p:nvPr>
+        </p:nvSpPr>
+        <p:spPr>
+          <a:xfrm>
+            <a:off x="838200" y="104912"/>
+            <a:ext cx="10515600" cy="1303758"/>
+          </a:xfrm>
+        </p:spPr>
+        <p:txBody>
+          <a:bodyPr>
+            <a:normAutofit/>
+          </a:bodyPr>
+          <a:lstStyle/>
+          <a:p>
+            <a:r>
+              <a:rPr lang="en-US"/>
+              <a:t>LFY1 vs LFY2</a:t>
+            </a:r>
+            <a:endParaRPr lang="en-US" dirty="0"/>
+          </a:p>
+        </p:txBody>
+      </p:sp>
+      <p:pic>
+        <p:nvPicPr>
+          <p:cNvPr id="8" name="Picture 7">
+            <a:extLst>
+              <a:ext uri="{FF2B5EF4-FFF2-40B4-BE49-F238E27FC236}">
+                <a16:creationId xmlns:a16="http://schemas.microsoft.com/office/drawing/2014/main" id="{42A8E184-C1D0-2000-3E5B-0FF8BF0E92D0}"/>
+              </a:ext>
+            </a:extLst>
+          </p:cNvPr>
+          <p:cNvPicPr>
+            <a:picLocks noChangeAspect="1"/>
+          </p:cNvPicPr>
+          <p:nvPr/>
+        </p:nvPicPr>
+        <p:blipFill>
+          <a:blip r:embed="rId3"/>
+          <a:stretch>
+            <a:fillRect/>
+          </a:stretch>
+        </p:blipFill>
+        <p:spPr>
+          <a:xfrm>
+            <a:off x="5312925" y="2248929"/>
+            <a:ext cx="6879075" cy="4243585"/>
+          </a:xfrm>
+          <a:prstGeom prst="rect">
+            <a:avLst/>
+          </a:prstGeom>
+        </p:spPr>
+      </p:pic>
+    </p:spTree>
+    <p:extLst>
+      <p:ext uri="{BB962C8B-B14F-4D97-AF65-F5344CB8AC3E}">
+        <p14:creationId xmlns:p14="http://schemas.microsoft.com/office/powerpoint/2010/main" val="114226695"/>
+      </p:ext>
+    </p:extLst>
+  </p:cSld>
+  <p:clrMapOvr>
+    <a:masterClrMapping/>
+  </p:clrMapOvr>
+</p:sld>
+</file>
+
+<file path=ppt/slides/slide8.xml><?xml version="1.0" encoding="utf-8"?>
+<p:sld xmlns:a="http://schemas.openxmlformats.org/drawingml/2006/main" xmlns:r="http://schemas.openxmlformats.org/officeDocument/2006/relationships" xmlns:p="http://schemas.openxmlformats.org/presentationml/2006/main">
+  <p:cSld>
+    <p:spTree>
+      <p:nvGrpSpPr>
+        <p:cNvPr id="1" name=""/>
+        <p:cNvGrpSpPr/>
+        <p:nvPr/>
+      </p:nvGrpSpPr>
+      <p:grpSpPr>
+        <a:xfrm>
+          <a:off x="0" y="0"/>
+          <a:ext cx="0" cy="0"/>
+          <a:chOff x="0" y="0"/>
+          <a:chExt cx="0" cy="0"/>
+        </a:xfrm>
+      </p:grpSpPr>
+      <p:pic>
+        <p:nvPicPr>
+          <p:cNvPr id="12" name="Picture 11">
+            <a:extLst>
+              <a:ext uri="{FF2B5EF4-FFF2-40B4-BE49-F238E27FC236}">
+                <a16:creationId xmlns:a16="http://schemas.microsoft.com/office/drawing/2014/main" id="{E212C713-499E-279B-89C7-228E33C98FA9}"/>
+              </a:ext>
+            </a:extLst>
+          </p:cNvPr>
+          <p:cNvPicPr>
+            <a:picLocks noChangeAspect="1"/>
+          </p:cNvPicPr>
+          <p:nvPr/>
+        </p:nvPicPr>
+        <p:blipFill>
+          <a:blip r:embed="rId2"/>
+          <a:stretch>
+            <a:fillRect/>
+          </a:stretch>
+        </p:blipFill>
+        <p:spPr>
+          <a:xfrm>
+            <a:off x="152400" y="630194"/>
+            <a:ext cx="10244812" cy="6146887"/>
+          </a:xfrm>
+          <a:prstGeom prst="rect">
+            <a:avLst/>
+          </a:prstGeom>
+        </p:spPr>
+      </p:pic>
+      <p:sp>
+        <p:nvSpPr>
+          <p:cNvPr id="2" name="Title 1">
+            <a:extLst>
+              <a:ext uri="{FF2B5EF4-FFF2-40B4-BE49-F238E27FC236}">
                 <a16:creationId xmlns:a16="http://schemas.microsoft.com/office/drawing/2014/main" id="{D43EB551-4C09-EB19-256D-64498FD196C7}"/>
               </a:ext>
             </a:extLst>
@@ -4279,36 +6263,6 @@
           </a:p>
         </p:txBody>
       </p:sp>
-      <p:pic>
-        <p:nvPicPr>
-          <p:cNvPr id="9" name="Picture 8">
-            <a:extLst>
-              <a:ext uri="{FF2B5EF4-FFF2-40B4-BE49-F238E27FC236}">
-                <a16:creationId xmlns:a16="http://schemas.microsoft.com/office/drawing/2014/main" id="{119343A7-7579-6010-315D-6A4B9887C83C}"/>
-              </a:ext>
-            </a:extLst>
-          </p:cNvPr>
-          <p:cNvPicPr>
-            <a:picLocks noChangeAspect="1"/>
-          </p:cNvPicPr>
-          <p:nvPr/>
-        </p:nvPicPr>
-        <p:blipFill>
-          <a:blip r:embed="rId2"/>
-          <a:stretch>
-            <a:fillRect/>
-          </a:stretch>
-        </p:blipFill>
-        <p:spPr>
-          <a:xfrm>
-            <a:off x="148282" y="710749"/>
-            <a:ext cx="9748644" cy="6037870"/>
-          </a:xfrm>
-          <a:prstGeom prst="rect">
-            <a:avLst/>
-          </a:prstGeom>
-        </p:spPr>
-      </p:pic>
       <p:sp>
         <p:nvSpPr>
           <p:cNvPr id="10" name="TextBox 9">
@@ -4357,27 +6311,125 @@
           <a:p>
             <a:r>
               <a:rPr lang="en-US" dirty="0"/>
-              <a:t>LFY1 is in </a:t>
-            </a:r>
-            <a:r>
-              <a:rPr lang="en-US" dirty="0" err="1"/>
-              <a:t>MEblack</a:t>
-            </a:r>
+              <a:t>LFY1 is in MIDNIGHT BLUE</a:t>
+            </a:r>
+          </a:p>
+          <a:p>
             <a:endParaRPr lang="en-US" dirty="0"/>
           </a:p>
           <a:p>
-            <a:endParaRPr lang="en-US" dirty="0"/>
-          </a:p>
-          <a:p>
             <a:r>
               <a:rPr lang="en-US" dirty="0"/>
-              <a:t>LFY2 is in </a:t>
-            </a:r>
-            <a:r>
-              <a:rPr lang="en-US" dirty="0" err="1"/>
-              <a:t>MEturquoise</a:t>
-            </a:r>
-            <a:endParaRPr lang="en-US" dirty="0"/>
+              <a:t>LFY2 is in MAGENTA</a:t>
+            </a:r>
+          </a:p>
+        </p:txBody>
+      </p:sp>
+      <p:sp>
+        <p:nvSpPr>
+          <p:cNvPr id="13" name="Rounded Rectangle 12">
+            <a:extLst>
+              <a:ext uri="{FF2B5EF4-FFF2-40B4-BE49-F238E27FC236}">
+                <a16:creationId xmlns:a16="http://schemas.microsoft.com/office/drawing/2014/main" id="{80252F5A-AE23-3EA1-5D06-C6495EA37FD7}"/>
+              </a:ext>
+            </a:extLst>
+          </p:cNvPr>
+          <p:cNvSpPr/>
+          <p:nvPr/>
+        </p:nvSpPr>
+        <p:spPr>
+          <a:xfrm>
+            <a:off x="733647" y="3581400"/>
+            <a:ext cx="1658679" cy="979967"/>
+          </a:xfrm>
+          <a:prstGeom prst="roundRect">
+            <a:avLst/>
+          </a:prstGeom>
+          <a:noFill/>
+          <a:ln w="38100">
+            <a:solidFill>
+              <a:srgbClr val="FF0000"/>
+            </a:solidFill>
+          </a:ln>
+        </p:spPr>
+        <p:style>
+          <a:lnRef idx="2">
+            <a:schemeClr val="accent1">
+              <a:shade val="15000"/>
+            </a:schemeClr>
+          </a:lnRef>
+          <a:fillRef idx="1">
+            <a:schemeClr val="accent1"/>
+          </a:fillRef>
+          <a:effectRef idx="0">
+            <a:schemeClr val="accent1"/>
+          </a:effectRef>
+          <a:fontRef idx="minor">
+            <a:schemeClr val="lt1"/>
+          </a:fontRef>
+        </p:style>
+        <p:txBody>
+          <a:bodyPr rtlCol="0" anchor="ctr"/>
+          <a:lstStyle/>
+          <a:p>
+            <a:pPr algn="ctr"/>
+            <a:endParaRPr lang="en-US"/>
+          </a:p>
+        </p:txBody>
+      </p:sp>
+      <p:sp>
+        <p:nvSpPr>
+          <p:cNvPr id="15" name="Rounded Rectangle 14">
+            <a:extLst>
+              <a:ext uri="{FF2B5EF4-FFF2-40B4-BE49-F238E27FC236}">
+                <a16:creationId xmlns:a16="http://schemas.microsoft.com/office/drawing/2014/main" id="{4EF14FE3-BD86-914F-4ABA-A1A4D82D2C38}"/>
+              </a:ext>
+            </a:extLst>
+          </p:cNvPr>
+          <p:cNvSpPr/>
+          <p:nvPr/>
+        </p:nvSpPr>
+        <p:spPr>
+          <a:xfrm>
+            <a:off x="2388300" y="3581400"/>
+            <a:ext cx="1658679" cy="979967"/>
+          </a:xfrm>
+          <a:prstGeom prst="roundRect">
+            <a:avLst/>
+          </a:prstGeom>
+          <a:noFill/>
+          <a:ln w="38100">
+            <a:solidFill>
+              <a:srgbClr val="00B0F0"/>
+            </a:solidFill>
+          </a:ln>
+        </p:spPr>
+        <p:style>
+          <a:lnRef idx="2">
+            <a:schemeClr val="accent1">
+              <a:shade val="15000"/>
+            </a:schemeClr>
+          </a:lnRef>
+          <a:fillRef idx="1">
+            <a:schemeClr val="accent1"/>
+          </a:fillRef>
+          <a:effectRef idx="0">
+            <a:schemeClr val="accent1"/>
+          </a:effectRef>
+          <a:fontRef idx="minor">
+            <a:schemeClr val="lt1"/>
+          </a:fontRef>
+        </p:style>
+        <p:txBody>
+          <a:bodyPr rtlCol="0" anchor="ctr"/>
+          <a:lstStyle/>
+          <a:p>
+            <a:pPr algn="ctr"/>
+            <a:endParaRPr lang="en-US">
+              <a:solidFill>
+                <a:srgbClr val="00B0F0"/>
+              </a:solidFill>
+            </a:endParaRPr>
           </a:p>
         </p:txBody>
       </p:sp>
@@ -4394,7 +6446,7 @@
 </p:sld>
 </file>
 
-<file path=ppt/slides/slide6.xml><?xml version="1.0" encoding="utf-8"?>
+<file path=ppt/slides/slide9.xml><?xml version="1.0" encoding="utf-8"?>
 <p:sld xmlns:a="http://schemas.openxmlformats.org/drawingml/2006/main" xmlns:r="http://schemas.openxmlformats.org/officeDocument/2006/relationships" xmlns:p="http://schemas.openxmlformats.org/presentationml/2006/main">
   <p:cSld>
     <p:spTree>
@@ -4680,36 +6732,26 @@
           <a:p>
             <a:r>
               <a:rPr lang="en-US" dirty="0"/>
-              <a:t>LFY1 is in </a:t>
-            </a:r>
-            <a:r>
-              <a:rPr lang="en-US" dirty="0" err="1"/>
-              <a:t>MEblack</a:t>
-            </a:r>
+              <a:t>LFY1 is in MIDNIGHT BLUE</a:t>
+            </a:r>
+          </a:p>
+          <a:p>
             <a:endParaRPr lang="en-US" dirty="0"/>
           </a:p>
           <a:p>
-            <a:endParaRPr lang="en-US" dirty="0"/>
-          </a:p>
-          <a:p>
             <a:r>
               <a:rPr lang="en-US" dirty="0"/>
-              <a:t>LFY2 is in </a:t>
-            </a:r>
-            <a:r>
-              <a:rPr lang="en-US" dirty="0" err="1"/>
-              <a:t>MEturquoise</a:t>
-            </a:r>
-            <a:endParaRPr lang="en-US" dirty="0"/>
+              <a:t>LFY2 is in MAGENTA</a:t>
+            </a:r>
           </a:p>
         </p:txBody>
       </p:sp>
       <p:pic>
         <p:nvPicPr>
-          <p:cNvPr id="8" name="Picture 7">
-            <a:extLst>
-              <a:ext uri="{FF2B5EF4-FFF2-40B4-BE49-F238E27FC236}">
-                <a16:creationId xmlns:a16="http://schemas.microsoft.com/office/drawing/2014/main" id="{61E8DC15-13CE-9DA5-98E7-B6FEFF373FF0}"/>
+          <p:cNvPr id="12" name="Picture 11">
+            <a:extLst>
+              <a:ext uri="{FF2B5EF4-FFF2-40B4-BE49-F238E27FC236}">
+                <a16:creationId xmlns:a16="http://schemas.microsoft.com/office/drawing/2014/main" id="{36838647-5E98-B5C9-FD2B-CF8610BAF7F4}"/>
               </a:ext>
             </a:extLst>
           </p:cNvPr>
@@ -4726,1089 +6768,122 @@
         </p:blipFill>
         <p:spPr>
           <a:xfrm>
-            <a:off x="275452" y="729046"/>
-            <a:ext cx="9774057" cy="6048035"/>
+            <a:off x="372583" y="729046"/>
+            <a:ext cx="9759958" cy="6039311"/>
           </a:xfrm>
           <a:prstGeom prst="rect">
             <a:avLst/>
           </a:prstGeom>
         </p:spPr>
       </p:pic>
+      <p:sp>
+        <p:nvSpPr>
+          <p:cNvPr id="13" name="Rounded Rectangle 12">
+            <a:extLst>
+              <a:ext uri="{FF2B5EF4-FFF2-40B4-BE49-F238E27FC236}">
+                <a16:creationId xmlns:a16="http://schemas.microsoft.com/office/drawing/2014/main" id="{B904447F-D171-7807-022C-D50534E89978}"/>
+              </a:ext>
+            </a:extLst>
+          </p:cNvPr>
+          <p:cNvSpPr/>
+          <p:nvPr/>
+        </p:nvSpPr>
+        <p:spPr>
+          <a:xfrm>
+            <a:off x="3810000" y="2307265"/>
+            <a:ext cx="218303" cy="4461092"/>
+          </a:xfrm>
+          <a:prstGeom prst="roundRect">
+            <a:avLst/>
+          </a:prstGeom>
+          <a:noFill/>
+          <a:ln w="38100">
+            <a:solidFill>
+              <a:srgbClr val="FF0000"/>
+            </a:solidFill>
+          </a:ln>
+        </p:spPr>
+        <p:style>
+          <a:lnRef idx="2">
+            <a:schemeClr val="accent1">
+              <a:shade val="15000"/>
+            </a:schemeClr>
+          </a:lnRef>
+          <a:fillRef idx="1">
+            <a:schemeClr val="accent1"/>
+          </a:fillRef>
+          <a:effectRef idx="0">
+            <a:schemeClr val="accent1"/>
+          </a:effectRef>
+          <a:fontRef idx="minor">
+            <a:schemeClr val="lt1"/>
+          </a:fontRef>
+        </p:style>
+        <p:txBody>
+          <a:bodyPr rtlCol="0" anchor="ctr"/>
+          <a:lstStyle/>
+          <a:p>
+            <a:pPr algn="ctr"/>
+            <a:endParaRPr lang="en-US"/>
+          </a:p>
+        </p:txBody>
+      </p:sp>
+      <p:sp>
+        <p:nvSpPr>
+          <p:cNvPr id="14" name="Rounded Rectangle 13">
+            <a:extLst>
+              <a:ext uri="{FF2B5EF4-FFF2-40B4-BE49-F238E27FC236}">
+                <a16:creationId xmlns:a16="http://schemas.microsoft.com/office/drawing/2014/main" id="{C397AB53-06D2-B126-8F98-D4A26548BADE}"/>
+              </a:ext>
+            </a:extLst>
+          </p:cNvPr>
+          <p:cNvSpPr/>
+          <p:nvPr/>
+        </p:nvSpPr>
+        <p:spPr>
+          <a:xfrm>
+            <a:off x="6098108" y="2307265"/>
+            <a:ext cx="218303" cy="4461092"/>
+          </a:xfrm>
+          <a:prstGeom prst="roundRect">
+            <a:avLst/>
+          </a:prstGeom>
+          <a:noFill/>
+          <a:ln w="38100">
+            <a:solidFill>
+              <a:srgbClr val="00B0F0"/>
+            </a:solidFill>
+          </a:ln>
+        </p:spPr>
+        <p:style>
+          <a:lnRef idx="2">
+            <a:schemeClr val="accent1">
+              <a:shade val="15000"/>
+            </a:schemeClr>
+          </a:lnRef>
+          <a:fillRef idx="1">
+            <a:schemeClr val="accent1"/>
+          </a:fillRef>
+          <a:effectRef idx="0">
+            <a:schemeClr val="accent1"/>
+          </a:effectRef>
+          <a:fontRef idx="minor">
+            <a:schemeClr val="lt1"/>
+          </a:fontRef>
+        </p:style>
+        <p:txBody>
+          <a:bodyPr rtlCol="0" anchor="ctr"/>
+          <a:lstStyle/>
+          <a:p>
+            <a:pPr algn="ctr"/>
+            <a:endParaRPr lang="en-US"/>
+          </a:p>
+        </p:txBody>
+      </p:sp>
     </p:spTree>
     <p:extLst>
       <p:ext uri="{BB962C8B-B14F-4D97-AF65-F5344CB8AC3E}">
         <p14:creationId xmlns:p14="http://schemas.microsoft.com/office/powerpoint/2010/main" val="1956443838"/>
-      </p:ext>
-    </p:extLst>
-  </p:cSld>
-  <p:clrMapOvr>
-    <a:masterClrMapping/>
-  </p:clrMapOvr>
-</p:sld>
-</file>
-
-<file path=ppt/slides/slide7.xml><?xml version="1.0" encoding="utf-8"?>
-<p:sld xmlns:a="http://schemas.openxmlformats.org/drawingml/2006/main" xmlns:r="http://schemas.openxmlformats.org/officeDocument/2006/relationships" xmlns:p="http://schemas.openxmlformats.org/presentationml/2006/main">
-  <p:cSld>
-    <p:spTree>
-      <p:nvGrpSpPr>
-        <p:cNvPr id="1" name="">
-          <a:extLst>
-            <a:ext uri="{FF2B5EF4-FFF2-40B4-BE49-F238E27FC236}">
-              <a16:creationId xmlns:a16="http://schemas.microsoft.com/office/drawing/2014/main" id="{0966912B-A684-06AB-36B9-F42137EC9654}"/>
-            </a:ext>
-          </a:extLst>
-        </p:cNvPr>
-        <p:cNvGrpSpPr/>
-        <p:nvPr/>
-      </p:nvGrpSpPr>
-      <p:grpSpPr>
-        <a:xfrm>
-          <a:off x="0" y="0"/>
-          <a:ext cx="0" cy="0"/>
-          <a:chOff x="0" y="0"/>
-          <a:chExt cx="0" cy="0"/>
-        </a:xfrm>
-      </p:grpSpPr>
-      <p:sp>
-        <p:nvSpPr>
-          <p:cNvPr id="2" name="Title 1">
-            <a:extLst>
-              <a:ext uri="{FF2B5EF4-FFF2-40B4-BE49-F238E27FC236}">
-                <a16:creationId xmlns:a16="http://schemas.microsoft.com/office/drawing/2014/main" id="{BCB27296-4E7C-2714-A966-DDBCBA996439}"/>
-              </a:ext>
-            </a:extLst>
-          </p:cNvPr>
-          <p:cNvSpPr>
-            <a:spLocks noGrp="1"/>
-          </p:cNvSpPr>
-          <p:nvPr>
-            <p:ph type="title"/>
-          </p:nvPr>
-        </p:nvSpPr>
-        <p:spPr>
-          <a:xfrm>
-            <a:off x="838200" y="80918"/>
-            <a:ext cx="10515600" cy="648129"/>
-          </a:xfrm>
-        </p:spPr>
-        <p:txBody>
-          <a:bodyPr>
-            <a:normAutofit fontScale="90000"/>
-          </a:bodyPr>
-          <a:lstStyle/>
-          <a:p>
-            <a:r>
-              <a:rPr lang="en-US" dirty="0"/>
-              <a:t>Network attempt 1: WGCNA, sporophyte</a:t>
-            </a:r>
-          </a:p>
-        </p:txBody>
-      </p:sp>
-      <p:sp>
-        <p:nvSpPr>
-          <p:cNvPr id="4" name="AutoShape 2">
-            <a:extLst>
-              <a:ext uri="{FF2B5EF4-FFF2-40B4-BE49-F238E27FC236}">
-                <a16:creationId xmlns:a16="http://schemas.microsoft.com/office/drawing/2014/main" id="{DBAA65A9-1A31-DBC0-BCC4-96B8F6D8CD7E}"/>
-              </a:ext>
-            </a:extLst>
-          </p:cNvPr>
-          <p:cNvSpPr>
-            <a:spLocks noChangeAspect="1" noChangeArrowheads="1"/>
-          </p:cNvSpPr>
-          <p:nvPr/>
-        </p:nvSpPr>
-        <p:spPr bwMode="auto">
-          <a:xfrm>
-            <a:off x="5943600" y="3276600"/>
-            <a:ext cx="304800" cy="304800"/>
-          </a:xfrm>
-          <a:prstGeom prst="rect">
-            <a:avLst/>
-          </a:prstGeom>
-          <a:noFill/>
-          <a:extLst>
-            <a:ext uri="{909E8E84-426E-40DD-AFC4-6F175D3DCCD1}">
-              <a14:hiddenFill xmlns:a14="http://schemas.microsoft.com/office/drawing/2010/main">
-                <a:solidFill>
-                  <a:srgbClr val="FFFFFF"/>
-                </a:solidFill>
-              </a14:hiddenFill>
-            </a:ext>
-          </a:extLst>
-        </p:spPr>
-        <p:txBody>
-          <a:bodyPr vert="horz" wrap="square" lIns="91440" tIns="45720" rIns="91440" bIns="45720" numCol="1" anchor="t" anchorCtr="0" compatLnSpc="1">
-            <a:prstTxWarp prst="textNoShape">
-              <a:avLst/>
-            </a:prstTxWarp>
-          </a:bodyPr>
-          <a:lstStyle/>
-          <a:p>
-            <a:endParaRPr lang="en-US"/>
-          </a:p>
-        </p:txBody>
-      </p:sp>
-      <p:sp>
-        <p:nvSpPr>
-          <p:cNvPr id="5" name="AutoShape 4">
-            <a:extLst>
-              <a:ext uri="{FF2B5EF4-FFF2-40B4-BE49-F238E27FC236}">
-                <a16:creationId xmlns:a16="http://schemas.microsoft.com/office/drawing/2014/main" id="{707B7639-70EA-FA50-3762-2A91C060EEAC}"/>
-              </a:ext>
-            </a:extLst>
-          </p:cNvPr>
-          <p:cNvSpPr>
-            <a:spLocks noChangeAspect="1" noChangeArrowheads="1"/>
-          </p:cNvSpPr>
-          <p:nvPr/>
-        </p:nvSpPr>
-        <p:spPr bwMode="auto">
-          <a:xfrm>
-            <a:off x="6096000" y="3429000"/>
-            <a:ext cx="304800" cy="304800"/>
-          </a:xfrm>
-          <a:prstGeom prst="rect">
-            <a:avLst/>
-          </a:prstGeom>
-          <a:noFill/>
-          <a:extLst>
-            <a:ext uri="{909E8E84-426E-40DD-AFC4-6F175D3DCCD1}">
-              <a14:hiddenFill xmlns:a14="http://schemas.microsoft.com/office/drawing/2010/main">
-                <a:solidFill>
-                  <a:srgbClr val="FFFFFF"/>
-                </a:solidFill>
-              </a14:hiddenFill>
-            </a:ext>
-          </a:extLst>
-        </p:spPr>
-        <p:txBody>
-          <a:bodyPr vert="horz" wrap="square" lIns="91440" tIns="45720" rIns="91440" bIns="45720" numCol="1" anchor="t" anchorCtr="0" compatLnSpc="1">
-            <a:prstTxWarp prst="textNoShape">
-              <a:avLst/>
-            </a:prstTxWarp>
-          </a:bodyPr>
-          <a:lstStyle/>
-          <a:p>
-            <a:endParaRPr lang="en-US"/>
-          </a:p>
-        </p:txBody>
-      </p:sp>
-      <p:sp>
-        <p:nvSpPr>
-          <p:cNvPr id="6" name="AutoShape 6">
-            <a:extLst>
-              <a:ext uri="{FF2B5EF4-FFF2-40B4-BE49-F238E27FC236}">
-                <a16:creationId xmlns:a16="http://schemas.microsoft.com/office/drawing/2014/main" id="{AE78DDD8-0660-8C6C-0D5E-C7BBCA0FF775}"/>
-              </a:ext>
-            </a:extLst>
-          </p:cNvPr>
-          <p:cNvSpPr>
-            <a:spLocks noChangeAspect="1" noChangeArrowheads="1"/>
-          </p:cNvSpPr>
-          <p:nvPr/>
-        </p:nvSpPr>
-        <p:spPr bwMode="auto">
-          <a:xfrm>
-            <a:off x="4114800" y="1447800"/>
-            <a:ext cx="2438400" cy="2438400"/>
-          </a:xfrm>
-          <a:prstGeom prst="rect">
-            <a:avLst/>
-          </a:prstGeom>
-          <a:noFill/>
-          <a:extLst>
-            <a:ext uri="{909E8E84-426E-40DD-AFC4-6F175D3DCCD1}">
-              <a14:hiddenFill xmlns:a14="http://schemas.microsoft.com/office/drawing/2010/main">
-                <a:solidFill>
-                  <a:srgbClr val="FFFFFF"/>
-                </a:solidFill>
-              </a14:hiddenFill>
-            </a:ext>
-          </a:extLst>
-        </p:spPr>
-        <p:txBody>
-          <a:bodyPr vert="horz" wrap="square" lIns="91440" tIns="45720" rIns="91440" bIns="45720" numCol="1" anchor="t" anchorCtr="0" compatLnSpc="1">
-            <a:prstTxWarp prst="textNoShape">
-              <a:avLst/>
-            </a:prstTxWarp>
-          </a:bodyPr>
-          <a:lstStyle/>
-          <a:p>
-            <a:endParaRPr lang="en-US"/>
-          </a:p>
-        </p:txBody>
-      </p:sp>
-      <p:sp>
-        <p:nvSpPr>
-          <p:cNvPr id="7" name="AutoShape 8">
-            <a:extLst>
-              <a:ext uri="{FF2B5EF4-FFF2-40B4-BE49-F238E27FC236}">
-                <a16:creationId xmlns:a16="http://schemas.microsoft.com/office/drawing/2014/main" id="{83636A0B-F713-5020-C036-8993E704BD6B}"/>
-              </a:ext>
-            </a:extLst>
-          </p:cNvPr>
-          <p:cNvSpPr>
-            <a:spLocks noChangeAspect="1" noChangeArrowheads="1"/>
-          </p:cNvSpPr>
-          <p:nvPr/>
-        </p:nvSpPr>
-        <p:spPr bwMode="auto">
-          <a:xfrm>
-            <a:off x="6248400" y="1213022"/>
-            <a:ext cx="2673178" cy="2673178"/>
-          </a:xfrm>
-          <a:prstGeom prst="rect">
-            <a:avLst/>
-          </a:prstGeom>
-          <a:noFill/>
-          <a:extLst>
-            <a:ext uri="{909E8E84-426E-40DD-AFC4-6F175D3DCCD1}">
-              <a14:hiddenFill xmlns:a14="http://schemas.microsoft.com/office/drawing/2010/main">
-                <a:solidFill>
-                  <a:srgbClr val="FFFFFF"/>
-                </a:solidFill>
-              </a14:hiddenFill>
-            </a:ext>
-          </a:extLst>
-        </p:spPr>
-        <p:txBody>
-          <a:bodyPr vert="horz" wrap="square" lIns="91440" tIns="45720" rIns="91440" bIns="45720" numCol="1" anchor="t" anchorCtr="0" compatLnSpc="1">
-            <a:prstTxWarp prst="textNoShape">
-              <a:avLst/>
-            </a:prstTxWarp>
-          </a:bodyPr>
-          <a:lstStyle/>
-          <a:p>
-            <a:endParaRPr lang="en-US"/>
-          </a:p>
-        </p:txBody>
-      </p:sp>
-      <p:sp>
-        <p:nvSpPr>
-          <p:cNvPr id="10" name="TextBox 9">
-            <a:extLst>
-              <a:ext uri="{FF2B5EF4-FFF2-40B4-BE49-F238E27FC236}">
-                <a16:creationId xmlns:a16="http://schemas.microsoft.com/office/drawing/2014/main" id="{657F750A-74B0-B889-847F-FD3304E4F975}"/>
-              </a:ext>
-            </a:extLst>
-          </p:cNvPr>
-          <p:cNvSpPr txBox="1"/>
-          <p:nvPr/>
-        </p:nvSpPr>
-        <p:spPr>
-          <a:xfrm>
-            <a:off x="10132541" y="506627"/>
-            <a:ext cx="1915297" cy="3139321"/>
-          </a:xfrm>
-          <a:prstGeom prst="rect">
-            <a:avLst/>
-          </a:prstGeom>
-          <a:noFill/>
-        </p:spPr>
-        <p:txBody>
-          <a:bodyPr wrap="square" rtlCol="0">
-            <a:spAutoFit/>
-          </a:bodyPr>
-          <a:lstStyle/>
-          <a:p>
-            <a:r>
-              <a:rPr lang="en-US" dirty="0"/>
-              <a:t>Each “color” is a module</a:t>
-            </a:r>
-          </a:p>
-          <a:p>
-            <a:endParaRPr lang="en-US" dirty="0"/>
-          </a:p>
-          <a:p>
-            <a:r>
-              <a:rPr lang="en-US" dirty="0"/>
-              <a:t>Y-axis is first PC of expression of that module</a:t>
-            </a:r>
-          </a:p>
-          <a:p>
-            <a:endParaRPr lang="en-US" dirty="0"/>
-          </a:p>
-          <a:p>
-            <a:r>
-              <a:rPr lang="en-US" dirty="0"/>
-              <a:t>LFY1 is in </a:t>
-            </a:r>
-            <a:r>
-              <a:rPr lang="en-US" dirty="0" err="1"/>
-              <a:t>MEturquoise</a:t>
-            </a:r>
-            <a:endParaRPr lang="en-US" dirty="0"/>
-          </a:p>
-          <a:p>
-            <a:endParaRPr lang="en-US" dirty="0"/>
-          </a:p>
-          <a:p>
-            <a:r>
-              <a:rPr lang="en-US" dirty="0"/>
-              <a:t>LFY2 is in </a:t>
-            </a:r>
-            <a:r>
-              <a:rPr lang="en-US" dirty="0" err="1"/>
-              <a:t>MEblue</a:t>
-            </a:r>
-            <a:endParaRPr lang="en-US" dirty="0"/>
-          </a:p>
-        </p:txBody>
-      </p:sp>
-      <p:pic>
-        <p:nvPicPr>
-          <p:cNvPr id="8" name="Picture 7">
-            <a:extLst>
-              <a:ext uri="{FF2B5EF4-FFF2-40B4-BE49-F238E27FC236}">
-                <a16:creationId xmlns:a16="http://schemas.microsoft.com/office/drawing/2014/main" id="{52FB850C-0760-9AD7-2719-7771C2BBF99E}"/>
-              </a:ext>
-            </a:extLst>
-          </p:cNvPr>
-          <p:cNvPicPr>
-            <a:picLocks noChangeAspect="1"/>
-          </p:cNvPicPr>
-          <p:nvPr/>
-        </p:nvPicPr>
-        <p:blipFill>
-          <a:blip r:embed="rId2"/>
-          <a:stretch>
-            <a:fillRect/>
-          </a:stretch>
-        </p:blipFill>
-        <p:spPr>
-          <a:xfrm>
-            <a:off x="144162" y="681679"/>
-            <a:ext cx="9889524" cy="6125124"/>
-          </a:xfrm>
-          <a:prstGeom prst="rect">
-            <a:avLst/>
-          </a:prstGeom>
-        </p:spPr>
-      </p:pic>
-    </p:spTree>
-    <p:extLst>
-      <p:ext uri="{BB962C8B-B14F-4D97-AF65-F5344CB8AC3E}">
-        <p14:creationId xmlns:p14="http://schemas.microsoft.com/office/powerpoint/2010/main" val="3885862352"/>
-      </p:ext>
-    </p:extLst>
-  </p:cSld>
-  <p:clrMapOvr>
-    <a:masterClrMapping/>
-  </p:clrMapOvr>
-</p:sld>
-</file>
-
-<file path=ppt/slides/slide8.xml><?xml version="1.0" encoding="utf-8"?>
-<p:sld xmlns:a="http://schemas.openxmlformats.org/drawingml/2006/main" xmlns:r="http://schemas.openxmlformats.org/officeDocument/2006/relationships" xmlns:p="http://schemas.openxmlformats.org/presentationml/2006/main">
-  <p:cSld>
-    <p:spTree>
-      <p:nvGrpSpPr>
-        <p:cNvPr id="1" name="">
-          <a:extLst>
-            <a:ext uri="{FF2B5EF4-FFF2-40B4-BE49-F238E27FC236}">
-              <a16:creationId xmlns:a16="http://schemas.microsoft.com/office/drawing/2014/main" id="{F5F17DC0-03DA-E9E4-EC77-BC3C72A1D29D}"/>
-            </a:ext>
-          </a:extLst>
-        </p:cNvPr>
-        <p:cNvGrpSpPr/>
-        <p:nvPr/>
-      </p:nvGrpSpPr>
-      <p:grpSpPr>
-        <a:xfrm>
-          <a:off x="0" y="0"/>
-          <a:ext cx="0" cy="0"/>
-          <a:chOff x="0" y="0"/>
-          <a:chExt cx="0" cy="0"/>
-        </a:xfrm>
-      </p:grpSpPr>
-      <p:sp>
-        <p:nvSpPr>
-          <p:cNvPr id="2" name="Title 1">
-            <a:extLst>
-              <a:ext uri="{FF2B5EF4-FFF2-40B4-BE49-F238E27FC236}">
-                <a16:creationId xmlns:a16="http://schemas.microsoft.com/office/drawing/2014/main" id="{CC473A95-1E34-3AC5-C98F-09CE2AFE6058}"/>
-              </a:ext>
-            </a:extLst>
-          </p:cNvPr>
-          <p:cNvSpPr>
-            <a:spLocks noGrp="1"/>
-          </p:cNvSpPr>
-          <p:nvPr>
-            <p:ph type="title"/>
-          </p:nvPr>
-        </p:nvSpPr>
-        <p:spPr>
-          <a:xfrm>
-            <a:off x="838200" y="80918"/>
-            <a:ext cx="10515600" cy="648129"/>
-          </a:xfrm>
-        </p:spPr>
-        <p:txBody>
-          <a:bodyPr>
-            <a:normAutofit fontScale="90000"/>
-          </a:bodyPr>
-          <a:lstStyle/>
-          <a:p>
-            <a:r>
-              <a:rPr lang="en-US" dirty="0"/>
-              <a:t>Network attempt 1: WGCNA, sporophyte</a:t>
-            </a:r>
-          </a:p>
-        </p:txBody>
-      </p:sp>
-      <p:sp>
-        <p:nvSpPr>
-          <p:cNvPr id="4" name="AutoShape 2">
-            <a:extLst>
-              <a:ext uri="{FF2B5EF4-FFF2-40B4-BE49-F238E27FC236}">
-                <a16:creationId xmlns:a16="http://schemas.microsoft.com/office/drawing/2014/main" id="{13AC5588-9364-EF23-1F17-6EC4FC9ADD66}"/>
-              </a:ext>
-            </a:extLst>
-          </p:cNvPr>
-          <p:cNvSpPr>
-            <a:spLocks noChangeAspect="1" noChangeArrowheads="1"/>
-          </p:cNvSpPr>
-          <p:nvPr/>
-        </p:nvSpPr>
-        <p:spPr bwMode="auto">
-          <a:xfrm>
-            <a:off x="5943600" y="3276600"/>
-            <a:ext cx="304800" cy="304800"/>
-          </a:xfrm>
-          <a:prstGeom prst="rect">
-            <a:avLst/>
-          </a:prstGeom>
-          <a:noFill/>
-          <a:extLst>
-            <a:ext uri="{909E8E84-426E-40DD-AFC4-6F175D3DCCD1}">
-              <a14:hiddenFill xmlns:a14="http://schemas.microsoft.com/office/drawing/2010/main">
-                <a:solidFill>
-                  <a:srgbClr val="FFFFFF"/>
-                </a:solidFill>
-              </a14:hiddenFill>
-            </a:ext>
-          </a:extLst>
-        </p:spPr>
-        <p:txBody>
-          <a:bodyPr vert="horz" wrap="square" lIns="91440" tIns="45720" rIns="91440" bIns="45720" numCol="1" anchor="t" anchorCtr="0" compatLnSpc="1">
-            <a:prstTxWarp prst="textNoShape">
-              <a:avLst/>
-            </a:prstTxWarp>
-          </a:bodyPr>
-          <a:lstStyle/>
-          <a:p>
-            <a:endParaRPr lang="en-US"/>
-          </a:p>
-        </p:txBody>
-      </p:sp>
-      <p:sp>
-        <p:nvSpPr>
-          <p:cNvPr id="5" name="AutoShape 4">
-            <a:extLst>
-              <a:ext uri="{FF2B5EF4-FFF2-40B4-BE49-F238E27FC236}">
-                <a16:creationId xmlns:a16="http://schemas.microsoft.com/office/drawing/2014/main" id="{ADF5AE60-48ED-BFAB-B1F7-7561EAA98B3F}"/>
-              </a:ext>
-            </a:extLst>
-          </p:cNvPr>
-          <p:cNvSpPr>
-            <a:spLocks noChangeAspect="1" noChangeArrowheads="1"/>
-          </p:cNvSpPr>
-          <p:nvPr/>
-        </p:nvSpPr>
-        <p:spPr bwMode="auto">
-          <a:xfrm>
-            <a:off x="6096000" y="3429000"/>
-            <a:ext cx="304800" cy="304800"/>
-          </a:xfrm>
-          <a:prstGeom prst="rect">
-            <a:avLst/>
-          </a:prstGeom>
-          <a:noFill/>
-          <a:extLst>
-            <a:ext uri="{909E8E84-426E-40DD-AFC4-6F175D3DCCD1}">
-              <a14:hiddenFill xmlns:a14="http://schemas.microsoft.com/office/drawing/2010/main">
-                <a:solidFill>
-                  <a:srgbClr val="FFFFFF"/>
-                </a:solidFill>
-              </a14:hiddenFill>
-            </a:ext>
-          </a:extLst>
-        </p:spPr>
-        <p:txBody>
-          <a:bodyPr vert="horz" wrap="square" lIns="91440" tIns="45720" rIns="91440" bIns="45720" numCol="1" anchor="t" anchorCtr="0" compatLnSpc="1">
-            <a:prstTxWarp prst="textNoShape">
-              <a:avLst/>
-            </a:prstTxWarp>
-          </a:bodyPr>
-          <a:lstStyle/>
-          <a:p>
-            <a:endParaRPr lang="en-US"/>
-          </a:p>
-        </p:txBody>
-      </p:sp>
-      <p:sp>
-        <p:nvSpPr>
-          <p:cNvPr id="6" name="AutoShape 6">
-            <a:extLst>
-              <a:ext uri="{FF2B5EF4-FFF2-40B4-BE49-F238E27FC236}">
-                <a16:creationId xmlns:a16="http://schemas.microsoft.com/office/drawing/2014/main" id="{26B03028-483F-D754-EDB3-1F234EB450F7}"/>
-              </a:ext>
-            </a:extLst>
-          </p:cNvPr>
-          <p:cNvSpPr>
-            <a:spLocks noChangeAspect="1" noChangeArrowheads="1"/>
-          </p:cNvSpPr>
-          <p:nvPr/>
-        </p:nvSpPr>
-        <p:spPr bwMode="auto">
-          <a:xfrm>
-            <a:off x="4114800" y="1447800"/>
-            <a:ext cx="2438400" cy="2438400"/>
-          </a:xfrm>
-          <a:prstGeom prst="rect">
-            <a:avLst/>
-          </a:prstGeom>
-          <a:noFill/>
-          <a:extLst>
-            <a:ext uri="{909E8E84-426E-40DD-AFC4-6F175D3DCCD1}">
-              <a14:hiddenFill xmlns:a14="http://schemas.microsoft.com/office/drawing/2010/main">
-                <a:solidFill>
-                  <a:srgbClr val="FFFFFF"/>
-                </a:solidFill>
-              </a14:hiddenFill>
-            </a:ext>
-          </a:extLst>
-        </p:spPr>
-        <p:txBody>
-          <a:bodyPr vert="horz" wrap="square" lIns="91440" tIns="45720" rIns="91440" bIns="45720" numCol="1" anchor="t" anchorCtr="0" compatLnSpc="1">
-            <a:prstTxWarp prst="textNoShape">
-              <a:avLst/>
-            </a:prstTxWarp>
-          </a:bodyPr>
-          <a:lstStyle/>
-          <a:p>
-            <a:endParaRPr lang="en-US"/>
-          </a:p>
-        </p:txBody>
-      </p:sp>
-      <p:sp>
-        <p:nvSpPr>
-          <p:cNvPr id="7" name="AutoShape 8">
-            <a:extLst>
-              <a:ext uri="{FF2B5EF4-FFF2-40B4-BE49-F238E27FC236}">
-                <a16:creationId xmlns:a16="http://schemas.microsoft.com/office/drawing/2014/main" id="{11E4D984-CB4A-6FE3-4437-E694864E9FBF}"/>
-              </a:ext>
-            </a:extLst>
-          </p:cNvPr>
-          <p:cNvSpPr>
-            <a:spLocks noChangeAspect="1" noChangeArrowheads="1"/>
-          </p:cNvSpPr>
-          <p:nvPr/>
-        </p:nvSpPr>
-        <p:spPr bwMode="auto">
-          <a:xfrm>
-            <a:off x="6248400" y="1213022"/>
-            <a:ext cx="2673178" cy="2673178"/>
-          </a:xfrm>
-          <a:prstGeom prst="rect">
-            <a:avLst/>
-          </a:prstGeom>
-          <a:noFill/>
-          <a:extLst>
-            <a:ext uri="{909E8E84-426E-40DD-AFC4-6F175D3DCCD1}">
-              <a14:hiddenFill xmlns:a14="http://schemas.microsoft.com/office/drawing/2010/main">
-                <a:solidFill>
-                  <a:srgbClr val="FFFFFF"/>
-                </a:solidFill>
-              </a14:hiddenFill>
-            </a:ext>
-          </a:extLst>
-        </p:spPr>
-        <p:txBody>
-          <a:bodyPr vert="horz" wrap="square" lIns="91440" tIns="45720" rIns="91440" bIns="45720" numCol="1" anchor="t" anchorCtr="0" compatLnSpc="1">
-            <a:prstTxWarp prst="textNoShape">
-              <a:avLst/>
-            </a:prstTxWarp>
-          </a:bodyPr>
-          <a:lstStyle/>
-          <a:p>
-            <a:endParaRPr lang="en-US"/>
-          </a:p>
-        </p:txBody>
-      </p:sp>
-      <p:sp>
-        <p:nvSpPr>
-          <p:cNvPr id="10" name="TextBox 9">
-            <a:extLst>
-              <a:ext uri="{FF2B5EF4-FFF2-40B4-BE49-F238E27FC236}">
-                <a16:creationId xmlns:a16="http://schemas.microsoft.com/office/drawing/2014/main" id="{0E669337-94A7-C26E-1290-A632CE970367}"/>
-              </a:ext>
-            </a:extLst>
-          </p:cNvPr>
-          <p:cNvSpPr txBox="1"/>
-          <p:nvPr/>
-        </p:nvSpPr>
-        <p:spPr>
-          <a:xfrm>
-            <a:off x="10132541" y="506627"/>
-            <a:ext cx="1915297" cy="3139321"/>
-          </a:xfrm>
-          <a:prstGeom prst="rect">
-            <a:avLst/>
-          </a:prstGeom>
-          <a:noFill/>
-        </p:spPr>
-        <p:txBody>
-          <a:bodyPr wrap="square" rtlCol="0">
-            <a:spAutoFit/>
-          </a:bodyPr>
-          <a:lstStyle/>
-          <a:p>
-            <a:r>
-              <a:rPr lang="en-US" dirty="0"/>
-              <a:t>Each “color” is a module</a:t>
-            </a:r>
-          </a:p>
-          <a:p>
-            <a:endParaRPr lang="en-US" dirty="0"/>
-          </a:p>
-          <a:p>
-            <a:r>
-              <a:rPr lang="en-US"/>
-              <a:t>heatmap </a:t>
-            </a:r>
-            <a:r>
-              <a:rPr lang="en-US" dirty="0"/>
-              <a:t>is first PC of expression of that module</a:t>
-            </a:r>
-          </a:p>
-          <a:p>
-            <a:endParaRPr lang="en-US" dirty="0"/>
-          </a:p>
-          <a:p>
-            <a:r>
-              <a:rPr lang="en-US" dirty="0"/>
-              <a:t>LFY1 is in </a:t>
-            </a:r>
-            <a:r>
-              <a:rPr lang="en-US" dirty="0" err="1"/>
-              <a:t>MEturquoise</a:t>
-            </a:r>
-            <a:endParaRPr lang="en-US" dirty="0"/>
-          </a:p>
-          <a:p>
-            <a:endParaRPr lang="en-US" dirty="0"/>
-          </a:p>
-          <a:p>
-            <a:r>
-              <a:rPr lang="en-US" dirty="0"/>
-              <a:t>LFY2 is in </a:t>
-            </a:r>
-            <a:r>
-              <a:rPr lang="en-US" dirty="0" err="1"/>
-              <a:t>MEblue</a:t>
-            </a:r>
-            <a:endParaRPr lang="en-US" dirty="0"/>
-          </a:p>
-        </p:txBody>
-      </p:sp>
-      <p:pic>
-        <p:nvPicPr>
-          <p:cNvPr id="9" name="Picture 8">
-            <a:extLst>
-              <a:ext uri="{FF2B5EF4-FFF2-40B4-BE49-F238E27FC236}">
-                <a16:creationId xmlns:a16="http://schemas.microsoft.com/office/drawing/2014/main" id="{EE012FA8-D5E9-FACA-929D-77494E0AD461}"/>
-              </a:ext>
-            </a:extLst>
-          </p:cNvPr>
-          <p:cNvPicPr>
-            <a:picLocks noChangeAspect="1"/>
-          </p:cNvPicPr>
-          <p:nvPr/>
-        </p:nvPicPr>
-        <p:blipFill>
-          <a:blip r:embed="rId2"/>
-          <a:stretch>
-            <a:fillRect/>
-          </a:stretch>
-        </p:blipFill>
-        <p:spPr>
-          <a:xfrm>
-            <a:off x="300166" y="729047"/>
-            <a:ext cx="9721164" cy="6015306"/>
-          </a:xfrm>
-          <a:prstGeom prst="rect">
-            <a:avLst/>
-          </a:prstGeom>
-        </p:spPr>
-      </p:pic>
-    </p:spTree>
-    <p:extLst>
-      <p:ext uri="{BB962C8B-B14F-4D97-AF65-F5344CB8AC3E}">
-        <p14:creationId xmlns:p14="http://schemas.microsoft.com/office/powerpoint/2010/main" val="1151543127"/>
-      </p:ext>
-    </p:extLst>
-  </p:cSld>
-  <p:clrMapOvr>
-    <a:masterClrMapping/>
-  </p:clrMapOvr>
-</p:sld>
-</file>
-
-<file path=ppt/slides/slide9.xml><?xml version="1.0" encoding="utf-8"?>
-<p:sld xmlns:a="http://schemas.openxmlformats.org/drawingml/2006/main" xmlns:r="http://schemas.openxmlformats.org/officeDocument/2006/relationships" xmlns:p="http://schemas.openxmlformats.org/presentationml/2006/main">
-  <p:cSld>
-    <p:spTree>
-      <p:nvGrpSpPr>
-        <p:cNvPr id="1" name="">
-          <a:extLst>
-            <a:ext uri="{FF2B5EF4-FFF2-40B4-BE49-F238E27FC236}">
-              <a16:creationId xmlns:a16="http://schemas.microsoft.com/office/drawing/2014/main" id="{69BE7484-C118-B77F-9F25-0CBCDB307637}"/>
-            </a:ext>
-          </a:extLst>
-        </p:cNvPr>
-        <p:cNvGrpSpPr/>
-        <p:nvPr/>
-      </p:nvGrpSpPr>
-      <p:grpSpPr>
-        <a:xfrm>
-          <a:off x="0" y="0"/>
-          <a:ext cx="0" cy="0"/>
-          <a:chOff x="0" y="0"/>
-          <a:chExt cx="0" cy="0"/>
-        </a:xfrm>
-      </p:grpSpPr>
-      <p:sp>
-        <p:nvSpPr>
-          <p:cNvPr id="2" name="Title 1">
-            <a:extLst>
-              <a:ext uri="{FF2B5EF4-FFF2-40B4-BE49-F238E27FC236}">
-                <a16:creationId xmlns:a16="http://schemas.microsoft.com/office/drawing/2014/main" id="{F46A6897-1FD8-CD66-9938-CE0A046DE782}"/>
-              </a:ext>
-            </a:extLst>
-          </p:cNvPr>
-          <p:cNvSpPr>
-            <a:spLocks noGrp="1"/>
-          </p:cNvSpPr>
-          <p:nvPr>
-            <p:ph type="title"/>
-          </p:nvPr>
-        </p:nvSpPr>
-        <p:spPr>
-          <a:xfrm>
-            <a:off x="838200" y="80918"/>
-            <a:ext cx="10515600" cy="648129"/>
-          </a:xfrm>
-        </p:spPr>
-        <p:txBody>
-          <a:bodyPr>
-            <a:normAutofit fontScale="90000"/>
-          </a:bodyPr>
-          <a:lstStyle/>
-          <a:p>
-            <a:r>
-              <a:rPr lang="en-US" dirty="0"/>
-              <a:t>Network attempt 1: WGCNA, gametophyte</a:t>
-            </a:r>
-          </a:p>
-        </p:txBody>
-      </p:sp>
-      <p:sp>
-        <p:nvSpPr>
-          <p:cNvPr id="4" name="AutoShape 2">
-            <a:extLst>
-              <a:ext uri="{FF2B5EF4-FFF2-40B4-BE49-F238E27FC236}">
-                <a16:creationId xmlns:a16="http://schemas.microsoft.com/office/drawing/2014/main" id="{E0AA1BE6-61EC-1C01-5D81-78B6C7BC679F}"/>
-              </a:ext>
-            </a:extLst>
-          </p:cNvPr>
-          <p:cNvSpPr>
-            <a:spLocks noChangeAspect="1" noChangeArrowheads="1"/>
-          </p:cNvSpPr>
-          <p:nvPr/>
-        </p:nvSpPr>
-        <p:spPr bwMode="auto">
-          <a:xfrm>
-            <a:off x="5943600" y="3276600"/>
-            <a:ext cx="304800" cy="304800"/>
-          </a:xfrm>
-          <a:prstGeom prst="rect">
-            <a:avLst/>
-          </a:prstGeom>
-          <a:noFill/>
-          <a:extLst>
-            <a:ext uri="{909E8E84-426E-40DD-AFC4-6F175D3DCCD1}">
-              <a14:hiddenFill xmlns:a14="http://schemas.microsoft.com/office/drawing/2010/main">
-                <a:solidFill>
-                  <a:srgbClr val="FFFFFF"/>
-                </a:solidFill>
-              </a14:hiddenFill>
-            </a:ext>
-          </a:extLst>
-        </p:spPr>
-        <p:txBody>
-          <a:bodyPr vert="horz" wrap="square" lIns="91440" tIns="45720" rIns="91440" bIns="45720" numCol="1" anchor="t" anchorCtr="0" compatLnSpc="1">
-            <a:prstTxWarp prst="textNoShape">
-              <a:avLst/>
-            </a:prstTxWarp>
-          </a:bodyPr>
-          <a:lstStyle/>
-          <a:p>
-            <a:endParaRPr lang="en-US"/>
-          </a:p>
-        </p:txBody>
-      </p:sp>
-      <p:sp>
-        <p:nvSpPr>
-          <p:cNvPr id="5" name="AutoShape 4">
-            <a:extLst>
-              <a:ext uri="{FF2B5EF4-FFF2-40B4-BE49-F238E27FC236}">
-                <a16:creationId xmlns:a16="http://schemas.microsoft.com/office/drawing/2014/main" id="{605C7EE7-7E62-62F8-6D97-5EC31786BD9B}"/>
-              </a:ext>
-            </a:extLst>
-          </p:cNvPr>
-          <p:cNvSpPr>
-            <a:spLocks noChangeAspect="1" noChangeArrowheads="1"/>
-          </p:cNvSpPr>
-          <p:nvPr/>
-        </p:nvSpPr>
-        <p:spPr bwMode="auto">
-          <a:xfrm>
-            <a:off x="6096000" y="3429000"/>
-            <a:ext cx="304800" cy="304800"/>
-          </a:xfrm>
-          <a:prstGeom prst="rect">
-            <a:avLst/>
-          </a:prstGeom>
-          <a:noFill/>
-          <a:extLst>
-            <a:ext uri="{909E8E84-426E-40DD-AFC4-6F175D3DCCD1}">
-              <a14:hiddenFill xmlns:a14="http://schemas.microsoft.com/office/drawing/2010/main">
-                <a:solidFill>
-                  <a:srgbClr val="FFFFFF"/>
-                </a:solidFill>
-              </a14:hiddenFill>
-            </a:ext>
-          </a:extLst>
-        </p:spPr>
-        <p:txBody>
-          <a:bodyPr vert="horz" wrap="square" lIns="91440" tIns="45720" rIns="91440" bIns="45720" numCol="1" anchor="t" anchorCtr="0" compatLnSpc="1">
-            <a:prstTxWarp prst="textNoShape">
-              <a:avLst/>
-            </a:prstTxWarp>
-          </a:bodyPr>
-          <a:lstStyle/>
-          <a:p>
-            <a:endParaRPr lang="en-US"/>
-          </a:p>
-        </p:txBody>
-      </p:sp>
-      <p:sp>
-        <p:nvSpPr>
-          <p:cNvPr id="6" name="AutoShape 6">
-            <a:extLst>
-              <a:ext uri="{FF2B5EF4-FFF2-40B4-BE49-F238E27FC236}">
-                <a16:creationId xmlns:a16="http://schemas.microsoft.com/office/drawing/2014/main" id="{2BFE5D49-48EF-1362-1210-CC80C64273E7}"/>
-              </a:ext>
-            </a:extLst>
-          </p:cNvPr>
-          <p:cNvSpPr>
-            <a:spLocks noChangeAspect="1" noChangeArrowheads="1"/>
-          </p:cNvSpPr>
-          <p:nvPr/>
-        </p:nvSpPr>
-        <p:spPr bwMode="auto">
-          <a:xfrm>
-            <a:off x="4114800" y="1447800"/>
-            <a:ext cx="2438400" cy="2438400"/>
-          </a:xfrm>
-          <a:prstGeom prst="rect">
-            <a:avLst/>
-          </a:prstGeom>
-          <a:noFill/>
-          <a:extLst>
-            <a:ext uri="{909E8E84-426E-40DD-AFC4-6F175D3DCCD1}">
-              <a14:hiddenFill xmlns:a14="http://schemas.microsoft.com/office/drawing/2010/main">
-                <a:solidFill>
-                  <a:srgbClr val="FFFFFF"/>
-                </a:solidFill>
-              </a14:hiddenFill>
-            </a:ext>
-          </a:extLst>
-        </p:spPr>
-        <p:txBody>
-          <a:bodyPr vert="horz" wrap="square" lIns="91440" tIns="45720" rIns="91440" bIns="45720" numCol="1" anchor="t" anchorCtr="0" compatLnSpc="1">
-            <a:prstTxWarp prst="textNoShape">
-              <a:avLst/>
-            </a:prstTxWarp>
-          </a:bodyPr>
-          <a:lstStyle/>
-          <a:p>
-            <a:endParaRPr lang="en-US"/>
-          </a:p>
-        </p:txBody>
-      </p:sp>
-      <p:sp>
-        <p:nvSpPr>
-          <p:cNvPr id="7" name="AutoShape 8">
-            <a:extLst>
-              <a:ext uri="{FF2B5EF4-FFF2-40B4-BE49-F238E27FC236}">
-                <a16:creationId xmlns:a16="http://schemas.microsoft.com/office/drawing/2014/main" id="{60D3FA03-F9C4-53A8-FC92-7D5EAA2CFB9D}"/>
-              </a:ext>
-            </a:extLst>
-          </p:cNvPr>
-          <p:cNvSpPr>
-            <a:spLocks noChangeAspect="1" noChangeArrowheads="1"/>
-          </p:cNvSpPr>
-          <p:nvPr/>
-        </p:nvSpPr>
-        <p:spPr bwMode="auto">
-          <a:xfrm>
-            <a:off x="6248400" y="1213022"/>
-            <a:ext cx="2673178" cy="2673178"/>
-          </a:xfrm>
-          <a:prstGeom prst="rect">
-            <a:avLst/>
-          </a:prstGeom>
-          <a:noFill/>
-          <a:extLst>
-            <a:ext uri="{909E8E84-426E-40DD-AFC4-6F175D3DCCD1}">
-              <a14:hiddenFill xmlns:a14="http://schemas.microsoft.com/office/drawing/2010/main">
-                <a:solidFill>
-                  <a:srgbClr val="FFFFFF"/>
-                </a:solidFill>
-              </a14:hiddenFill>
-            </a:ext>
-          </a:extLst>
-        </p:spPr>
-        <p:txBody>
-          <a:bodyPr vert="horz" wrap="square" lIns="91440" tIns="45720" rIns="91440" bIns="45720" numCol="1" anchor="t" anchorCtr="0" compatLnSpc="1">
-            <a:prstTxWarp prst="textNoShape">
-              <a:avLst/>
-            </a:prstTxWarp>
-          </a:bodyPr>
-          <a:lstStyle/>
-          <a:p>
-            <a:endParaRPr lang="en-US"/>
-          </a:p>
-        </p:txBody>
-      </p:sp>
-      <p:sp>
-        <p:nvSpPr>
-          <p:cNvPr id="10" name="TextBox 9">
-            <a:extLst>
-              <a:ext uri="{FF2B5EF4-FFF2-40B4-BE49-F238E27FC236}">
-                <a16:creationId xmlns:a16="http://schemas.microsoft.com/office/drawing/2014/main" id="{2C517800-456D-04D5-33F8-8297903740C8}"/>
-              </a:ext>
-            </a:extLst>
-          </p:cNvPr>
-          <p:cNvSpPr txBox="1"/>
-          <p:nvPr/>
-        </p:nvSpPr>
-        <p:spPr>
-          <a:xfrm>
-            <a:off x="10132541" y="506627"/>
-            <a:ext cx="1915297" cy="3693319"/>
-          </a:xfrm>
-          <a:prstGeom prst="rect">
-            <a:avLst/>
-          </a:prstGeom>
-          <a:noFill/>
-        </p:spPr>
-        <p:txBody>
-          <a:bodyPr wrap="square" rtlCol="0">
-            <a:spAutoFit/>
-          </a:bodyPr>
-          <a:lstStyle/>
-          <a:p>
-            <a:r>
-              <a:rPr lang="en-US" dirty="0"/>
-              <a:t>Each “color” is a module</a:t>
-            </a:r>
-          </a:p>
-          <a:p>
-            <a:endParaRPr lang="en-US" dirty="0"/>
-          </a:p>
-          <a:p>
-            <a:r>
-              <a:rPr lang="en-US" dirty="0"/>
-              <a:t>Y-axis is first PC of expression of that module</a:t>
-            </a:r>
-          </a:p>
-          <a:p>
-            <a:endParaRPr lang="en-US" dirty="0"/>
-          </a:p>
-          <a:p>
-            <a:r>
-              <a:rPr lang="en-US" dirty="0"/>
-              <a:t>LFY1 is in </a:t>
-            </a:r>
-            <a:r>
-              <a:rPr lang="en-US" dirty="0" err="1"/>
-              <a:t>MEblue</a:t>
-            </a:r>
-            <a:r>
-              <a:rPr lang="en-US" dirty="0"/>
-              <a:t> &amp; alternative transcript is in </a:t>
-            </a:r>
-            <a:r>
-              <a:rPr lang="en-US" dirty="0" err="1"/>
-              <a:t>MEturquoise</a:t>
-            </a:r>
-            <a:endParaRPr lang="en-US" dirty="0"/>
-          </a:p>
-          <a:p>
-            <a:endParaRPr lang="en-US" dirty="0"/>
-          </a:p>
-          <a:p>
-            <a:r>
-              <a:rPr lang="en-US" dirty="0"/>
-              <a:t>LFY2 is in </a:t>
-            </a:r>
-            <a:r>
-              <a:rPr lang="en-US" dirty="0" err="1"/>
-              <a:t>MEblue</a:t>
-            </a:r>
-            <a:endParaRPr lang="en-US" dirty="0"/>
-          </a:p>
-        </p:txBody>
-      </p:sp>
-      <p:pic>
-        <p:nvPicPr>
-          <p:cNvPr id="9" name="Picture 8">
-            <a:extLst>
-              <a:ext uri="{FF2B5EF4-FFF2-40B4-BE49-F238E27FC236}">
-                <a16:creationId xmlns:a16="http://schemas.microsoft.com/office/drawing/2014/main" id="{4B09ECAE-1DDE-C9DB-116D-433C1B121FEE}"/>
-              </a:ext>
-            </a:extLst>
-          </p:cNvPr>
-          <p:cNvPicPr>
-            <a:picLocks noChangeAspect="1"/>
-          </p:cNvPicPr>
-          <p:nvPr/>
-        </p:nvPicPr>
-        <p:blipFill>
-          <a:blip r:embed="rId2"/>
-          <a:stretch>
-            <a:fillRect/>
-          </a:stretch>
-        </p:blipFill>
-        <p:spPr>
-          <a:xfrm>
-            <a:off x="144162" y="720811"/>
-            <a:ext cx="9609738" cy="5951838"/>
-          </a:xfrm>
-          <a:prstGeom prst="rect">
-            <a:avLst/>
-          </a:prstGeom>
-        </p:spPr>
-      </p:pic>
-    </p:spTree>
-    <p:extLst>
-      <p:ext uri="{BB962C8B-B14F-4D97-AF65-F5344CB8AC3E}">
-        <p14:creationId xmlns:p14="http://schemas.microsoft.com/office/powerpoint/2010/main" val="2256113573"/>
       </p:ext>
     </p:extLst>
   </p:cSld>

</xml_diff>